<commit_message>
docs: revise poster for the upcoming tv show on Friday
Signed-off-by: Jinghao Jia <jinghao7@illinois.edu>
</commit_message>
<xml_diff>
--- a/docs/poster.pptx
+++ b/docs/poster.pptx
@@ -4,6 +4,9 @@
   <p:sldMasterIdLst>
     <p:sldMasterId id="2147483660" r:id="rId1"/>
   </p:sldMasterIdLst>
+  <p:notesMasterIdLst>
+    <p:notesMasterId r:id="rId4"/>
+  </p:notesMasterIdLst>
   <p:sldIdLst>
     <p:sldId id="256" r:id="rId2"/>
     <p:sldId id="257" r:id="rId3"/>
@@ -113,6 +116,355 @@
 </p:presentation>
 </file>
 
+<file path=ppt/notesMasters/notesMaster1.xml><?xml version="1.0" encoding="utf-8"?>
+<p:notesMaster xmlns:a="http://schemas.openxmlformats.org/drawingml/2006/main" xmlns:r="http://schemas.openxmlformats.org/officeDocument/2006/relationships" xmlns:p="http://schemas.openxmlformats.org/presentationml/2006/main">
+  <p:cSld>
+    <p:bg>
+      <p:bgRef idx="1001">
+        <a:schemeClr val="bg1"/>
+      </p:bgRef>
+    </p:bg>
+    <p:spTree>
+      <p:nvGrpSpPr>
+        <p:cNvPr id="1" name=""/>
+        <p:cNvGrpSpPr/>
+        <p:nvPr/>
+      </p:nvGrpSpPr>
+      <p:grpSpPr>
+        <a:xfrm>
+          <a:off x="0" y="0"/>
+          <a:ext cx="0" cy="0"/>
+          <a:chOff x="0" y="0"/>
+          <a:chExt cx="0" cy="0"/>
+        </a:xfrm>
+      </p:grpSpPr>
+      <p:sp>
+        <p:nvSpPr>
+          <p:cNvPr id="2" name="Header Placeholder 1"/>
+          <p:cNvSpPr>
+            <a:spLocks noGrp="1"/>
+          </p:cNvSpPr>
+          <p:nvPr>
+            <p:ph type="hdr" sz="quarter"/>
+          </p:nvPr>
+        </p:nvSpPr>
+        <p:spPr>
+          <a:xfrm>
+            <a:off x="0" y="0"/>
+            <a:ext cx="2971800" cy="458788"/>
+          </a:xfrm>
+          <a:prstGeom prst="rect">
+            <a:avLst/>
+          </a:prstGeom>
+        </p:spPr>
+        <p:txBody>
+          <a:bodyPr vert="horz" lIns="91440" tIns="45720" rIns="91440" bIns="45720" rtlCol="0"/>
+          <a:lstStyle>
+            <a:lvl1pPr algn="l">
+              <a:defRPr sz="1200"/>
+            </a:lvl1pPr>
+          </a:lstStyle>
+          <a:p>
+            <a:endParaRPr lang="en-US"/>
+          </a:p>
+        </p:txBody>
+      </p:sp>
+      <p:sp>
+        <p:nvSpPr>
+          <p:cNvPr id="3" name="Date Placeholder 2"/>
+          <p:cNvSpPr>
+            <a:spLocks noGrp="1"/>
+          </p:cNvSpPr>
+          <p:nvPr>
+            <p:ph type="dt" idx="1"/>
+          </p:nvPr>
+        </p:nvSpPr>
+        <p:spPr>
+          <a:xfrm>
+            <a:off x="3884613" y="0"/>
+            <a:ext cx="2971800" cy="458788"/>
+          </a:xfrm>
+          <a:prstGeom prst="rect">
+            <a:avLst/>
+          </a:prstGeom>
+        </p:spPr>
+        <p:txBody>
+          <a:bodyPr vert="horz" lIns="91440" tIns="45720" rIns="91440" bIns="45720" rtlCol="0"/>
+          <a:lstStyle>
+            <a:lvl1pPr algn="r">
+              <a:defRPr sz="1200"/>
+            </a:lvl1pPr>
+          </a:lstStyle>
+          <a:p>
+            <a:fld id="{CCFE1385-8EF7-1C45-B54D-17258D0E10F1}" type="datetimeFigureOut">
+              <a:rPr lang="en-US" smtClean="0"/>
+              <a:t>3/1/23</a:t>
+            </a:fld>
+            <a:endParaRPr lang="en-US"/>
+          </a:p>
+        </p:txBody>
+      </p:sp>
+      <p:sp>
+        <p:nvSpPr>
+          <p:cNvPr id="4" name="Slide Image Placeholder 3"/>
+          <p:cNvSpPr>
+            <a:spLocks noGrp="1" noRot="1" noChangeAspect="1"/>
+          </p:cNvSpPr>
+          <p:nvPr>
+            <p:ph type="sldImg" idx="2"/>
+          </p:nvPr>
+        </p:nvSpPr>
+        <p:spPr>
+          <a:xfrm>
+            <a:off x="1114425" y="1143000"/>
+            <a:ext cx="4629150" cy="3086100"/>
+          </a:xfrm>
+          <a:prstGeom prst="rect">
+            <a:avLst/>
+          </a:prstGeom>
+          <a:noFill/>
+          <a:ln w="12700">
+            <a:solidFill>
+              <a:prstClr val="black"/>
+            </a:solidFill>
+          </a:ln>
+        </p:spPr>
+        <p:txBody>
+          <a:bodyPr vert="horz" lIns="91440" tIns="45720" rIns="91440" bIns="45720" rtlCol="0" anchor="ctr"/>
+          <a:lstStyle/>
+          <a:p>
+            <a:endParaRPr lang="en-US"/>
+          </a:p>
+        </p:txBody>
+      </p:sp>
+      <p:sp>
+        <p:nvSpPr>
+          <p:cNvPr id="5" name="Notes Placeholder 4"/>
+          <p:cNvSpPr>
+            <a:spLocks noGrp="1"/>
+          </p:cNvSpPr>
+          <p:nvPr>
+            <p:ph type="body" sz="quarter" idx="3"/>
+          </p:nvPr>
+        </p:nvSpPr>
+        <p:spPr>
+          <a:xfrm>
+            <a:off x="685800" y="4400550"/>
+            <a:ext cx="5486400" cy="3600450"/>
+          </a:xfrm>
+          <a:prstGeom prst="rect">
+            <a:avLst/>
+          </a:prstGeom>
+        </p:spPr>
+        <p:txBody>
+          <a:bodyPr vert="horz" lIns="91440" tIns="45720" rIns="91440" bIns="45720" rtlCol="0"/>
+          <a:lstStyle/>
+          <a:p>
+            <a:pPr lvl="0"/>
+            <a:r>
+              <a:rPr lang="en-US"/>
+              <a:t>Click to edit Master text styles</a:t>
+            </a:r>
+          </a:p>
+          <a:p>
+            <a:pPr lvl="1"/>
+            <a:r>
+              <a:rPr lang="en-US"/>
+              <a:t>Second level</a:t>
+            </a:r>
+          </a:p>
+          <a:p>
+            <a:pPr lvl="2"/>
+            <a:r>
+              <a:rPr lang="en-US"/>
+              <a:t>Third level</a:t>
+            </a:r>
+          </a:p>
+          <a:p>
+            <a:pPr lvl="3"/>
+            <a:r>
+              <a:rPr lang="en-US"/>
+              <a:t>Fourth level</a:t>
+            </a:r>
+          </a:p>
+          <a:p>
+            <a:pPr lvl="4"/>
+            <a:r>
+              <a:rPr lang="en-US"/>
+              <a:t>Fifth level</a:t>
+            </a:r>
+          </a:p>
+        </p:txBody>
+      </p:sp>
+      <p:sp>
+        <p:nvSpPr>
+          <p:cNvPr id="6" name="Footer Placeholder 5"/>
+          <p:cNvSpPr>
+            <a:spLocks noGrp="1"/>
+          </p:cNvSpPr>
+          <p:nvPr>
+            <p:ph type="ftr" sz="quarter" idx="4"/>
+          </p:nvPr>
+        </p:nvSpPr>
+        <p:spPr>
+          <a:xfrm>
+            <a:off x="0" y="8685213"/>
+            <a:ext cx="2971800" cy="458787"/>
+          </a:xfrm>
+          <a:prstGeom prst="rect">
+            <a:avLst/>
+          </a:prstGeom>
+        </p:spPr>
+        <p:txBody>
+          <a:bodyPr vert="horz" lIns="91440" tIns="45720" rIns="91440" bIns="45720" rtlCol="0" anchor="b"/>
+          <a:lstStyle>
+            <a:lvl1pPr algn="l">
+              <a:defRPr sz="1200"/>
+            </a:lvl1pPr>
+          </a:lstStyle>
+          <a:p>
+            <a:endParaRPr lang="en-US"/>
+          </a:p>
+        </p:txBody>
+      </p:sp>
+      <p:sp>
+        <p:nvSpPr>
+          <p:cNvPr id="7" name="Slide Number Placeholder 6"/>
+          <p:cNvSpPr>
+            <a:spLocks noGrp="1"/>
+          </p:cNvSpPr>
+          <p:nvPr>
+            <p:ph type="sldNum" sz="quarter" idx="5"/>
+          </p:nvPr>
+        </p:nvSpPr>
+        <p:spPr>
+          <a:xfrm>
+            <a:off x="3884613" y="8685213"/>
+            <a:ext cx="2971800" cy="458787"/>
+          </a:xfrm>
+          <a:prstGeom prst="rect">
+            <a:avLst/>
+          </a:prstGeom>
+        </p:spPr>
+        <p:txBody>
+          <a:bodyPr vert="horz" lIns="91440" tIns="45720" rIns="91440" bIns="45720" rtlCol="0" anchor="b"/>
+          <a:lstStyle>
+            <a:lvl1pPr algn="r">
+              <a:defRPr sz="1200"/>
+            </a:lvl1pPr>
+          </a:lstStyle>
+          <a:p>
+            <a:fld id="{50CF7CDE-DFD3-8B46-BDD3-F3CB76B01739}" type="slidenum">
+              <a:rPr lang="en-US" smtClean="0"/>
+              <a:t>‹#›</a:t>
+            </a:fld>
+            <a:endParaRPr lang="en-US"/>
+          </a:p>
+        </p:txBody>
+      </p:sp>
+    </p:spTree>
+    <p:extLst>
+      <p:ext uri="{BB962C8B-B14F-4D97-AF65-F5344CB8AC3E}">
+        <p14:creationId xmlns:p14="http://schemas.microsoft.com/office/powerpoint/2010/main" val="656211769"/>
+      </p:ext>
+    </p:extLst>
+  </p:cSld>
+  <p:clrMap bg1="lt1" tx1="dk1" bg2="lt2" tx2="dk2" accent1="accent1" accent2="accent2" accent3="accent3" accent4="accent4" accent5="accent5" accent6="accent6" hlink="hlink" folHlink="folHlink"/>
+  <p:notesStyle>
+    <a:lvl1pPr marL="0" algn="l" defTabSz="914400" rtl="0" eaLnBrk="1" latinLnBrk="0" hangingPunct="1">
+      <a:defRPr sz="1200" kern="1200">
+        <a:solidFill>
+          <a:schemeClr val="tx1"/>
+        </a:solidFill>
+        <a:latin typeface="+mn-lt"/>
+        <a:ea typeface="+mn-ea"/>
+        <a:cs typeface="+mn-cs"/>
+      </a:defRPr>
+    </a:lvl1pPr>
+    <a:lvl2pPr marL="457200" algn="l" defTabSz="914400" rtl="0" eaLnBrk="1" latinLnBrk="0" hangingPunct="1">
+      <a:defRPr sz="1200" kern="1200">
+        <a:solidFill>
+          <a:schemeClr val="tx1"/>
+        </a:solidFill>
+        <a:latin typeface="+mn-lt"/>
+        <a:ea typeface="+mn-ea"/>
+        <a:cs typeface="+mn-cs"/>
+      </a:defRPr>
+    </a:lvl2pPr>
+    <a:lvl3pPr marL="914400" algn="l" defTabSz="914400" rtl="0" eaLnBrk="1" latinLnBrk="0" hangingPunct="1">
+      <a:defRPr sz="1200" kern="1200">
+        <a:solidFill>
+          <a:schemeClr val="tx1"/>
+        </a:solidFill>
+        <a:latin typeface="+mn-lt"/>
+        <a:ea typeface="+mn-ea"/>
+        <a:cs typeface="+mn-cs"/>
+      </a:defRPr>
+    </a:lvl3pPr>
+    <a:lvl4pPr marL="1371600" algn="l" defTabSz="914400" rtl="0" eaLnBrk="1" latinLnBrk="0" hangingPunct="1">
+      <a:defRPr sz="1200" kern="1200">
+        <a:solidFill>
+          <a:schemeClr val="tx1"/>
+        </a:solidFill>
+        <a:latin typeface="+mn-lt"/>
+        <a:ea typeface="+mn-ea"/>
+        <a:cs typeface="+mn-cs"/>
+      </a:defRPr>
+    </a:lvl4pPr>
+    <a:lvl5pPr marL="1828800" algn="l" defTabSz="914400" rtl="0" eaLnBrk="1" latinLnBrk="0" hangingPunct="1">
+      <a:defRPr sz="1200" kern="1200">
+        <a:solidFill>
+          <a:schemeClr val="tx1"/>
+        </a:solidFill>
+        <a:latin typeface="+mn-lt"/>
+        <a:ea typeface="+mn-ea"/>
+        <a:cs typeface="+mn-cs"/>
+      </a:defRPr>
+    </a:lvl5pPr>
+    <a:lvl6pPr marL="2286000" algn="l" defTabSz="914400" rtl="0" eaLnBrk="1" latinLnBrk="0" hangingPunct="1">
+      <a:defRPr sz="1200" kern="1200">
+        <a:solidFill>
+          <a:schemeClr val="tx1"/>
+        </a:solidFill>
+        <a:latin typeface="+mn-lt"/>
+        <a:ea typeface="+mn-ea"/>
+        <a:cs typeface="+mn-cs"/>
+      </a:defRPr>
+    </a:lvl6pPr>
+    <a:lvl7pPr marL="2743200" algn="l" defTabSz="914400" rtl="0" eaLnBrk="1" latinLnBrk="0" hangingPunct="1">
+      <a:defRPr sz="1200" kern="1200">
+        <a:solidFill>
+          <a:schemeClr val="tx1"/>
+        </a:solidFill>
+        <a:latin typeface="+mn-lt"/>
+        <a:ea typeface="+mn-ea"/>
+        <a:cs typeface="+mn-cs"/>
+      </a:defRPr>
+    </a:lvl7pPr>
+    <a:lvl8pPr marL="3200400" algn="l" defTabSz="914400" rtl="0" eaLnBrk="1" latinLnBrk="0" hangingPunct="1">
+      <a:defRPr sz="1200" kern="1200">
+        <a:solidFill>
+          <a:schemeClr val="tx1"/>
+        </a:solidFill>
+        <a:latin typeface="+mn-lt"/>
+        <a:ea typeface="+mn-ea"/>
+        <a:cs typeface="+mn-cs"/>
+      </a:defRPr>
+    </a:lvl8pPr>
+    <a:lvl9pPr marL="3657600" algn="l" defTabSz="914400" rtl="0" eaLnBrk="1" latinLnBrk="0" hangingPunct="1">
+      <a:defRPr sz="1200" kern="1200">
+        <a:solidFill>
+          <a:schemeClr val="tx1"/>
+        </a:solidFill>
+        <a:latin typeface="+mn-lt"/>
+        <a:ea typeface="+mn-ea"/>
+        <a:cs typeface="+mn-cs"/>
+      </a:defRPr>
+    </a:lvl9pPr>
+  </p:notesStyle>
+</p:notesMaster>
+</file>
+
 <file path=ppt/slideLayouts/slideLayout1.xml><?xml version="1.0" encoding="utf-8"?>
 <p:sldLayout xmlns:a="http://schemas.openxmlformats.org/drawingml/2006/main" xmlns:r="http://schemas.openxmlformats.org/officeDocument/2006/relationships" xmlns:p="http://schemas.openxmlformats.org/presentationml/2006/main" type="title" preserve="1">
   <p:cSld name="Title Slide">
@@ -244,7 +596,7 @@
           <a:p>
             <a:fld id="{4058F962-8E8D-684D-837B-07C1B0C5F522}" type="datetimeFigureOut">
               <a:rPr lang="en-US" smtClean="0"/>
-              <a:t>2/28/23</a:t>
+              <a:t>3/1/23</a:t>
             </a:fld>
             <a:endParaRPr lang="en-US"/>
           </a:p>
@@ -414,7 +766,7 @@
           <a:p>
             <a:fld id="{4058F962-8E8D-684D-837B-07C1B0C5F522}" type="datetimeFigureOut">
               <a:rPr lang="en-US" smtClean="0"/>
-              <a:t>2/28/23</a:t>
+              <a:t>3/1/23</a:t>
             </a:fld>
             <a:endParaRPr lang="en-US"/>
           </a:p>
@@ -594,7 +946,7 @@
           <a:p>
             <a:fld id="{4058F962-8E8D-684D-837B-07C1B0C5F522}" type="datetimeFigureOut">
               <a:rPr lang="en-US" smtClean="0"/>
-              <a:t>2/28/23</a:t>
+              <a:t>3/1/23</a:t>
             </a:fld>
             <a:endParaRPr lang="en-US"/>
           </a:p>
@@ -764,7 +1116,7 @@
           <a:p>
             <a:fld id="{4058F962-8E8D-684D-837B-07C1B0C5F522}" type="datetimeFigureOut">
               <a:rPr lang="en-US" smtClean="0"/>
-              <a:t>2/28/23</a:t>
+              <a:t>3/1/23</a:t>
             </a:fld>
             <a:endParaRPr lang="en-US"/>
           </a:p>
@@ -1008,7 +1360,7 @@
           <a:p>
             <a:fld id="{4058F962-8E8D-684D-837B-07C1B0C5F522}" type="datetimeFigureOut">
               <a:rPr lang="en-US" smtClean="0"/>
-              <a:t>2/28/23</a:t>
+              <a:t>3/1/23</a:t>
             </a:fld>
             <a:endParaRPr lang="en-US"/>
           </a:p>
@@ -1240,7 +1592,7 @@
           <a:p>
             <a:fld id="{4058F962-8E8D-684D-837B-07C1B0C5F522}" type="datetimeFigureOut">
               <a:rPr lang="en-US" smtClean="0"/>
-              <a:t>2/28/23</a:t>
+              <a:t>3/1/23</a:t>
             </a:fld>
             <a:endParaRPr lang="en-US"/>
           </a:p>
@@ -1607,7 +1959,7 @@
           <a:p>
             <a:fld id="{4058F962-8E8D-684D-837B-07C1B0C5F522}" type="datetimeFigureOut">
               <a:rPr lang="en-US" smtClean="0"/>
-              <a:t>2/28/23</a:t>
+              <a:t>3/1/23</a:t>
             </a:fld>
             <a:endParaRPr lang="en-US"/>
           </a:p>
@@ -1725,7 +2077,7 @@
           <a:p>
             <a:fld id="{4058F962-8E8D-684D-837B-07C1B0C5F522}" type="datetimeFigureOut">
               <a:rPr lang="en-US" smtClean="0"/>
-              <a:t>2/28/23</a:t>
+              <a:t>3/1/23</a:t>
             </a:fld>
             <a:endParaRPr lang="en-US"/>
           </a:p>
@@ -1820,7 +2172,7 @@
           <a:p>
             <a:fld id="{4058F962-8E8D-684D-837B-07C1B0C5F522}" type="datetimeFigureOut">
               <a:rPr lang="en-US" smtClean="0"/>
-              <a:t>2/28/23</a:t>
+              <a:t>3/1/23</a:t>
             </a:fld>
             <a:endParaRPr lang="en-US"/>
           </a:p>
@@ -2097,7 +2449,7 @@
           <a:p>
             <a:fld id="{4058F962-8E8D-684D-837B-07C1B0C5F522}" type="datetimeFigureOut">
               <a:rPr lang="en-US" smtClean="0"/>
-              <a:t>2/28/23</a:t>
+              <a:t>3/1/23</a:t>
             </a:fld>
             <a:endParaRPr lang="en-US"/>
           </a:p>
@@ -2354,7 +2706,7 @@
           <a:p>
             <a:fld id="{4058F962-8E8D-684D-837B-07C1B0C5F522}" type="datetimeFigureOut">
               <a:rPr lang="en-US" smtClean="0"/>
-              <a:t>2/28/23</a:t>
+              <a:t>3/1/23</a:t>
             </a:fld>
             <a:endParaRPr lang="en-US"/>
           </a:p>
@@ -2567,7 +2919,7 @@
           <a:p>
             <a:fld id="{4058F962-8E8D-684D-837B-07C1B0C5F522}" type="datetimeFigureOut">
               <a:rPr lang="en-US" smtClean="0"/>
-              <a:t>2/28/23</a:t>
+              <a:t>3/1/23</a:t>
             </a:fld>
             <a:endParaRPr lang="en-US"/>
           </a:p>
@@ -3427,7 +3779,24 @@
                 <a:latin typeface="Arial" panose="020B0604020202020204" pitchFamily="34" charset="0"/>
                 <a:cs typeface="Arial" panose="020B0604020202020204" pitchFamily="34" charset="0"/>
               </a:rPr>
-              <a:t>The ad-hoc nature of the </a:t>
+              <a:t>The </a:t>
+            </a:r>
+            <a:r>
+              <a:rPr lang="en-US" sz="4000" b="1" dirty="0">
+                <a:solidFill>
+                  <a:srgbClr val="D97C3A"/>
+                </a:solidFill>
+                <a:latin typeface="Arial" panose="020B0604020202020204" pitchFamily="34" charset="0"/>
+                <a:cs typeface="Arial" panose="020B0604020202020204" pitchFamily="34" charset="0"/>
+              </a:rPr>
+              <a:t>ad-hoc nature</a:t>
+            </a:r>
+            <a:r>
+              <a:rPr lang="en-US" sz="4000" dirty="0">
+                <a:latin typeface="Arial" panose="020B0604020202020204" pitchFamily="34" charset="0"/>
+                <a:cs typeface="Arial" panose="020B0604020202020204" pitchFamily="34" charset="0"/>
+              </a:rPr>
+              <a:t> of the </a:t>
             </a:r>
             <a:r>
               <a:rPr lang="en-US" sz="4000" dirty="0" err="1">
@@ -3516,7 +3885,7 @@
         </p:nvGrpSpPr>
         <p:grpSpPr>
           <a:xfrm>
-            <a:off x="1064779" y="15769065"/>
+            <a:off x="11537845" y="4251215"/>
             <a:ext cx="9842710" cy="962661"/>
             <a:chOff x="2050473" y="5070762"/>
             <a:chExt cx="7509164" cy="962661"/>
@@ -3627,8 +3996,8 @@
         </p:nvSpPr>
         <p:spPr>
           <a:xfrm>
-            <a:off x="1064779" y="16731724"/>
-            <a:ext cx="9842710" cy="3785652"/>
+            <a:off x="11537845" y="5213874"/>
+            <a:ext cx="9842710" cy="3170099"/>
           </a:xfrm>
           <a:prstGeom prst="rect">
             <a:avLst/>
@@ -3650,7 +4019,24 @@
                 <a:latin typeface="Arial" panose="020B0604020202020204" pitchFamily="34" charset="0"/>
                 <a:cs typeface="Arial" panose="020B0604020202020204" pitchFamily="34" charset="0"/>
               </a:rPr>
-              <a:t>The extension language should be more expressive </a:t>
+              <a:t>Use a </a:t>
+            </a:r>
+            <a:r>
+              <a:rPr lang="en-US" sz="4000" b="1" dirty="0">
+                <a:solidFill>
+                  <a:srgbClr val="D97C3A"/>
+                </a:solidFill>
+                <a:latin typeface="Arial" panose="020B0604020202020204" pitchFamily="34" charset="0"/>
+                <a:cs typeface="Arial" panose="020B0604020202020204" pitchFamily="34" charset="0"/>
+              </a:rPr>
+              <a:t>more expressive</a:t>
+            </a:r>
+            <a:r>
+              <a:rPr lang="en-US" sz="4000" dirty="0">
+                <a:latin typeface="Arial" panose="020B0604020202020204" pitchFamily="34" charset="0"/>
+                <a:cs typeface="Arial" panose="020B0604020202020204" pitchFamily="34" charset="0"/>
+              </a:rPr>
+              <a:t> language</a:t>
             </a:r>
           </a:p>
           <a:p>
@@ -3659,11 +4045,21 @@
               <a:buChar char="•"/>
             </a:pPr>
             <a:r>
+              <a:rPr lang="en-US" sz="4000" b="1" dirty="0">
+                <a:solidFill>
+                  <a:srgbClr val="D97C3A"/>
+                </a:solidFill>
+                <a:latin typeface="Arial" panose="020B0604020202020204" pitchFamily="34" charset="0"/>
+                <a:cs typeface="Arial" panose="020B0604020202020204" pitchFamily="34" charset="0"/>
+              </a:rPr>
+              <a:t>Decouple</a:t>
+            </a:r>
+            <a:r>
               <a:rPr lang="en-US" sz="4000" dirty="0">
                 <a:latin typeface="Arial" panose="020B0604020202020204" pitchFamily="34" charset="0"/>
                 <a:cs typeface="Arial" panose="020B0604020202020204" pitchFamily="34" charset="0"/>
               </a:rPr>
-              <a:t>Static code analysis should be decoupled from the kernel. </a:t>
+              <a:t> static code analysis from the kernel</a:t>
             </a:r>
           </a:p>
           <a:p>
@@ -3676,7 +4072,17 @@
                 <a:latin typeface="Arial" panose="020B0604020202020204" pitchFamily="34" charset="0"/>
                 <a:cs typeface="Arial" panose="020B0604020202020204" pitchFamily="34" charset="0"/>
               </a:rPr>
-              <a:t>Static analyses and runtime mechanisms should work together. </a:t>
+              <a:t>Complement static analyses with </a:t>
+            </a:r>
+            <a:r>
+              <a:rPr lang="en-US" sz="4000" b="1" dirty="0">
+                <a:solidFill>
+                  <a:srgbClr val="D97C3A"/>
+                </a:solidFill>
+                <a:latin typeface="Arial" panose="020B0604020202020204" pitchFamily="34" charset="0"/>
+                <a:cs typeface="Arial" panose="020B0604020202020204" pitchFamily="34" charset="0"/>
+              </a:rPr>
+              <a:t>runtime mechanisms</a:t>
             </a:r>
           </a:p>
         </p:txBody>
@@ -3695,7 +4101,7 @@
         </p:nvGrpSpPr>
         <p:grpSpPr>
           <a:xfrm>
-            <a:off x="11537845" y="4251217"/>
+            <a:off x="11537845" y="8558542"/>
             <a:ext cx="9842710" cy="962661"/>
             <a:chOff x="2050473" y="5070762"/>
             <a:chExt cx="7509164" cy="962661"/>
@@ -3823,8 +4229,8 @@
         </p:nvSpPr>
         <p:spPr>
           <a:xfrm>
-            <a:off x="11537845" y="5213876"/>
-            <a:ext cx="9842710" cy="10556736"/>
+            <a:off x="11537845" y="9521201"/>
+            <a:ext cx="9842710" cy="6863417"/>
           </a:xfrm>
           <a:prstGeom prst="rect">
             <a:avLst/>
@@ -3859,7 +4265,7 @@
                 <a:latin typeface="Arial" panose="020B0604020202020204" pitchFamily="34" charset="0"/>
                 <a:cs typeface="Arial" panose="020B0604020202020204" pitchFamily="34" charset="0"/>
               </a:rPr>
-              <a:t>Safety guarantees from language: UB, memory, kernel resource management, etc.</a:t>
+              <a:t>Language-based safety</a:t>
             </a:r>
           </a:p>
           <a:p>
@@ -3872,7 +4278,46 @@
                 <a:latin typeface="Arial" panose="020B0604020202020204" pitchFamily="34" charset="0"/>
                 <a:cs typeface="Arial" panose="020B0604020202020204" pitchFamily="34" charset="0"/>
               </a:rPr>
-              <a:t>Expressiveness: e.g., more complex loop constructs</a:t>
+              <a:t>Expressiveness</a:t>
+            </a:r>
+          </a:p>
+          <a:p>
+            <a:pPr marL="571500" indent="-571500">
+              <a:buFont typeface="Arial" panose="020B0604020202020204" pitchFamily="34" charset="0"/>
+              <a:buChar char="•"/>
+            </a:pPr>
+            <a:r>
+              <a:rPr lang="en-US" sz="4000" dirty="0">
+                <a:latin typeface="Arial" panose="020B0604020202020204" pitchFamily="34" charset="0"/>
+                <a:cs typeface="Arial" panose="020B0604020202020204" pitchFamily="34" charset="0"/>
+              </a:rPr>
+              <a:t>Trusted kernel interface in safe (and some unsafe) Rust</a:t>
+            </a:r>
+          </a:p>
+          <a:p>
+            <a:pPr marL="571500" indent="-571500">
+              <a:buFont typeface="Arial" panose="020B0604020202020204" pitchFamily="34" charset="0"/>
+              <a:buChar char="•"/>
+            </a:pPr>
+            <a:r>
+              <a:rPr lang="en-US" sz="4000" dirty="0">
+                <a:latin typeface="Arial" panose="020B0604020202020204" pitchFamily="34" charset="0"/>
+                <a:cs typeface="Arial" panose="020B0604020202020204" pitchFamily="34" charset="0"/>
+              </a:rPr>
+              <a:t>Trusted Rust toolchain to check and sign the program</a:t>
+            </a:r>
+          </a:p>
+          <a:p>
+            <a:pPr marL="571500" indent="-571500">
+              <a:buFont typeface="Arial" panose="020B0604020202020204" pitchFamily="34" charset="0"/>
+              <a:buChar char="•"/>
+            </a:pPr>
+            <a:r>
+              <a:rPr lang="en-US" sz="4000" dirty="0">
+                <a:latin typeface="Arial" panose="020B0604020202020204" pitchFamily="34" charset="0"/>
+                <a:cs typeface="Arial" panose="020B0604020202020204" pitchFamily="34" charset="0"/>
+              </a:rPr>
+              <a:t>Runtime protection mechanisms</a:t>
             </a:r>
           </a:p>
           <a:p>
@@ -3885,7 +4330,20 @@
                 <a:latin typeface="Arial" panose="020B0604020202020204" pitchFamily="34" charset="0"/>
                 <a:cs typeface="Arial" panose="020B0604020202020204" pitchFamily="34" charset="0"/>
               </a:rPr>
-              <a:t>Trusted kernel crate handles interaction between extension program and kernel</a:t>
+              <a:t>Watch dog timers</a:t>
+            </a:r>
+          </a:p>
+          <a:p>
+            <a:pPr marL="1028645" lvl="1" indent="-571500">
+              <a:buFont typeface="Arial" panose="020B0604020202020204" pitchFamily="34" charset="0"/>
+              <a:buChar char="•"/>
+            </a:pPr>
+            <a:r>
+              <a:rPr lang="en-US" sz="4000" dirty="0">
+                <a:latin typeface="Arial" panose="020B0604020202020204" pitchFamily="34" charset="0"/>
+                <a:cs typeface="Arial" panose="020B0604020202020204" pitchFamily="34" charset="0"/>
+              </a:rPr>
+              <a:t>Stack protection</a:t>
             </a:r>
           </a:p>
           <a:p>
@@ -3898,72 +4356,7 @@
                 <a:latin typeface="Arial" panose="020B0604020202020204" pitchFamily="34" charset="0"/>
                 <a:cs typeface="Arial" panose="020B0604020202020204" pitchFamily="34" charset="0"/>
               </a:rPr>
-              <a:t>Leverage trusted compiler toolchain </a:t>
-            </a:r>
-          </a:p>
-          <a:p>
-            <a:pPr marL="1028645" lvl="1" indent="-571500">
-              <a:buFont typeface="Arial" panose="020B0604020202020204" pitchFamily="34" charset="0"/>
-              <a:buChar char="•"/>
-            </a:pPr>
-            <a:r>
-              <a:rPr lang="en-US" sz="4000" dirty="0">
-                <a:latin typeface="Arial" panose="020B0604020202020204" pitchFamily="34" charset="0"/>
-                <a:cs typeface="Arial" panose="020B0604020202020204" pitchFamily="34" charset="0"/>
-              </a:rPr>
-              <a:t>checks safety properties out of kernel</a:t>
-            </a:r>
-          </a:p>
-          <a:p>
-            <a:pPr marL="1028645" lvl="1" indent="-571500">
-              <a:buFont typeface="Arial" panose="020B0604020202020204" pitchFamily="34" charset="0"/>
-              <a:buChar char="•"/>
-            </a:pPr>
-            <a:r>
-              <a:rPr lang="en-US" sz="4000" dirty="0">
-                <a:latin typeface="Arial" panose="020B0604020202020204" pitchFamily="34" charset="0"/>
-                <a:cs typeface="Arial" panose="020B0604020202020204" pitchFamily="34" charset="0"/>
-              </a:rPr>
-              <a:t>signs the program</a:t>
-            </a:r>
-          </a:p>
-          <a:p>
-            <a:pPr marL="571500" indent="-571500">
-              <a:buFont typeface="Arial" panose="020B0604020202020204" pitchFamily="34" charset="0"/>
-              <a:buChar char="•"/>
-            </a:pPr>
-            <a:r>
-              <a:rPr lang="en-US" sz="4000" dirty="0">
-                <a:latin typeface="Arial" panose="020B0604020202020204" pitchFamily="34" charset="0"/>
-                <a:cs typeface="Arial" panose="020B0604020202020204" pitchFamily="34" charset="0"/>
-              </a:rPr>
-              <a:t>Runtime protection mechanisms</a:t>
-            </a:r>
-          </a:p>
-          <a:p>
-            <a:pPr marL="1028645" lvl="1" indent="-571500">
-              <a:buFont typeface="Arial" panose="020B0604020202020204" pitchFamily="34" charset="0"/>
-              <a:buChar char="•"/>
-            </a:pPr>
-            <a:r>
-              <a:rPr lang="en-US" sz="4000" dirty="0">
-                <a:latin typeface="Arial" panose="020B0604020202020204" pitchFamily="34" charset="0"/>
-                <a:cs typeface="Arial" panose="020B0604020202020204" pitchFamily="34" charset="0"/>
-              </a:rPr>
-              <a:t>Watch dog timers to prevent infinite loops, deadlocks, etc.</a:t>
-            </a:r>
-          </a:p>
-          <a:p>
-            <a:pPr marL="1028645" lvl="1" indent="-571500">
-              <a:buFont typeface="Arial" panose="020B0604020202020204" pitchFamily="34" charset="0"/>
-              <a:buChar char="•"/>
-            </a:pPr>
-            <a:r>
-              <a:rPr lang="en-US" sz="4000" dirty="0">
-                <a:latin typeface="Arial" panose="020B0604020202020204" pitchFamily="34" charset="0"/>
-                <a:cs typeface="Arial" panose="020B0604020202020204" pitchFamily="34" charset="0"/>
-              </a:rPr>
-              <a:t>Stack protection again kernel stack overflow</a:t>
+              <a:t>Simplify/eliminate unsafe helper code</a:t>
             </a:r>
           </a:p>
         </p:txBody>
@@ -3990,7 +4383,7 @@
         </p:blipFill>
         <p:spPr>
           <a:xfrm>
-            <a:off x="11537845" y="15865674"/>
+            <a:off x="11537845" y="16731726"/>
             <a:ext cx="9842710" cy="4658262"/>
           </a:xfrm>
           <a:prstGeom prst="rect">
@@ -4103,7 +4496,7 @@
                   <a:latin typeface="Arial" panose="020B0604020202020204" pitchFamily="34" charset="0"/>
                   <a:cs typeface="Arial" panose="020B0604020202020204" pitchFamily="34" charset="0"/>
                 </a:rPr>
-                <a:t>  Safety without escape hatches</a:t>
+                <a:t>  Case study: RAII for safety</a:t>
               </a:r>
             </a:p>
           </p:txBody>
@@ -4124,7 +4517,7 @@
         <p:spPr>
           <a:xfrm>
             <a:off x="22010911" y="5213876"/>
-            <a:ext cx="9842710" cy="10556736"/>
+            <a:ext cx="9842710" cy="1938992"/>
           </a:xfrm>
           <a:prstGeom prst="rect">
             <a:avLst/>
@@ -4142,25 +4535,18 @@
               <a:buChar char="•"/>
             </a:pPr>
             <a:r>
+              <a:rPr lang="en-US" sz="4000" dirty="0" err="1">
+                <a:latin typeface="Arial" panose="020B0604020202020204" pitchFamily="34" charset="0"/>
+                <a:cs typeface="Arial" panose="020B0604020202020204" pitchFamily="34" charset="0"/>
+              </a:rPr>
+              <a:t>eBPF</a:t>
+            </a:r>
+            <a:r>
               <a:rPr lang="en-US" sz="4000" dirty="0">
                 <a:latin typeface="Arial" panose="020B0604020202020204" pitchFamily="34" charset="0"/>
                 <a:cs typeface="Arial" panose="020B0604020202020204" pitchFamily="34" charset="0"/>
               </a:rPr>
-              <a:t>Helpers introduced to compensate the lack of expressiveness in </a:t>
-            </a:r>
-            <a:r>
-              <a:rPr lang="en-US" sz="4000" dirty="0" err="1">
-                <a:latin typeface="Arial" panose="020B0604020202020204" pitchFamily="34" charset="0"/>
-                <a:cs typeface="Arial" panose="020B0604020202020204" pitchFamily="34" charset="0"/>
-              </a:rPr>
-              <a:t>eBPF</a:t>
-            </a:r>
-            <a:r>
-              <a:rPr lang="en-US" sz="4000" dirty="0">
-                <a:latin typeface="Arial" panose="020B0604020202020204" pitchFamily="34" charset="0"/>
-                <a:cs typeface="Arial" panose="020B0604020202020204" pitchFamily="34" charset="0"/>
-              </a:rPr>
-              <a:t> can be retired </a:t>
+              <a:t> verifies resources management</a:t>
             </a:r>
           </a:p>
           <a:p>
@@ -4173,335 +4559,56 @@
                 <a:latin typeface="Arial" panose="020B0604020202020204" pitchFamily="34" charset="0"/>
                 <a:cs typeface="Arial" panose="020B0604020202020204" pitchFamily="34" charset="0"/>
               </a:rPr>
-              <a:t>e.g., </a:t>
-            </a:r>
-            <a:r>
-              <a:rPr lang="en-US" sz="4000" dirty="0" err="1">
-                <a:latin typeface="Menlo" panose="020B0609030804020204" pitchFamily="49" charset="0"/>
-                <a:ea typeface="Menlo" panose="020B0609030804020204" pitchFamily="49" charset="0"/>
-                <a:cs typeface="Menlo" panose="020B0609030804020204" pitchFamily="49" charset="0"/>
-              </a:rPr>
-              <a:t>bpf_strtol</a:t>
-            </a:r>
-            <a:r>
-              <a:rPr lang="en-US" sz="4000" dirty="0">
-                <a:latin typeface="Menlo" panose="020B0609030804020204" pitchFamily="49" charset="0"/>
-                <a:ea typeface="Menlo" panose="020B0609030804020204" pitchFamily="49" charset="0"/>
-                <a:cs typeface="Menlo" panose="020B0609030804020204" pitchFamily="49" charset="0"/>
-              </a:rPr>
-              <a:t>()</a:t>
-            </a:r>
-            <a:r>
-              <a:rPr lang="en-US" sz="4000" dirty="0">
+              <a:t>e.g., ensure spinlock release</a:t>
+            </a:r>
+            <a:r>
+              <a:rPr lang="en-US" sz="4000" b="1" dirty="0">
+                <a:solidFill>
+                  <a:srgbClr val="D97C3A"/>
+                </a:solidFill>
                 <a:latin typeface="Arial" panose="020B0604020202020204" pitchFamily="34" charset="0"/>
                 <a:cs typeface="Arial" panose="020B0604020202020204" pitchFamily="34" charset="0"/>
               </a:rPr>
-              <a:t> can be replaced by </a:t>
-            </a:r>
-            <a:r>
-              <a:rPr lang="en-US" sz="4000" dirty="0">
-                <a:latin typeface="Menlo" panose="020B0609030804020204" pitchFamily="49" charset="0"/>
-                <a:ea typeface="Menlo" panose="020B0609030804020204" pitchFamily="49" charset="0"/>
-                <a:cs typeface="Menlo" panose="020B0609030804020204" pitchFamily="49" charset="0"/>
-              </a:rPr>
-              <a:t>core::str::parse()</a:t>
-            </a:r>
-            <a:r>
-              <a:rPr lang="en-US" sz="4000" dirty="0">
-                <a:latin typeface="Arial" panose="020B0604020202020204" pitchFamily="34" charset="0"/>
-                <a:cs typeface="Arial" panose="020B0604020202020204" pitchFamily="34" charset="0"/>
-              </a:rPr>
-              <a:t> in Rust and no longer needs to call into unsafe C code in kernel.</a:t>
-            </a:r>
-          </a:p>
-          <a:p>
-            <a:pPr marL="571500" indent="-571500">
-              <a:buFont typeface="Arial" panose="020B0604020202020204" pitchFamily="34" charset="0"/>
-              <a:buChar char="•"/>
-            </a:pPr>
-            <a:r>
-              <a:rPr lang="en-US" sz="4000" dirty="0">
-                <a:latin typeface="Arial" panose="020B0604020202020204" pitchFamily="34" charset="0"/>
-                <a:cs typeface="Arial" panose="020B0604020202020204" pitchFamily="34" charset="0"/>
-              </a:rPr>
-              <a:t>Complex, error-prone C helper code can be simplified by moving certain code to safe Rust</a:t>
-            </a:r>
-          </a:p>
-          <a:p>
-            <a:pPr marL="1028645" lvl="1" indent="-571500">
-              <a:buFont typeface="Arial" panose="020B0604020202020204" pitchFamily="34" charset="0"/>
-              <a:buChar char="•"/>
-            </a:pPr>
-            <a:r>
-              <a:rPr lang="en-US" sz="4000" dirty="0">
-                <a:latin typeface="Arial" panose="020B0604020202020204" pitchFamily="34" charset="0"/>
-                <a:cs typeface="Arial" panose="020B0604020202020204" pitchFamily="34" charset="0"/>
-              </a:rPr>
-              <a:t>Use RAII pattern to safely manage kernel resources, e.g., ref-counts</a:t>
-            </a:r>
-          </a:p>
-          <a:p>
-            <a:pPr marL="1028645" lvl="1" indent="-571500">
-              <a:buFont typeface="Arial" panose="020B0604020202020204" pitchFamily="34" charset="0"/>
-              <a:buChar char="•"/>
-            </a:pPr>
-            <a:r>
-              <a:rPr lang="en-US" sz="4000" dirty="0">
-                <a:latin typeface="Arial" panose="020B0604020202020204" pitchFamily="34" charset="0"/>
-                <a:cs typeface="Arial" panose="020B0604020202020204" pitchFamily="34" charset="0"/>
-              </a:rPr>
-              <a:t>Integer overflow checking </a:t>
-            </a:r>
-          </a:p>
-          <a:p>
-            <a:pPr marL="571500" indent="-571500">
-              <a:buFont typeface="Arial" panose="020B0604020202020204" pitchFamily="34" charset="0"/>
-              <a:buChar char="•"/>
-            </a:pPr>
-            <a:r>
-              <a:rPr lang="en-US" sz="4000" dirty="0">
-                <a:latin typeface="Arial" panose="020B0604020202020204" pitchFamily="34" charset="0"/>
-                <a:cs typeface="Arial" panose="020B0604020202020204" pitchFamily="34" charset="0"/>
-              </a:rPr>
-              <a:t>Safe interface on top of unsafe code</a:t>
-            </a:r>
-          </a:p>
-          <a:p>
-            <a:pPr marL="1028645" lvl="1" indent="-571500">
-              <a:buFont typeface="Arial" panose="020B0604020202020204" pitchFamily="34" charset="0"/>
-              <a:buChar char="•"/>
-            </a:pPr>
-            <a:r>
-              <a:rPr lang="en-US" sz="4000" dirty="0">
-                <a:latin typeface="Arial" panose="020B0604020202020204" pitchFamily="34" charset="0"/>
-                <a:cs typeface="Arial" panose="020B0604020202020204" pitchFamily="34" charset="0"/>
-              </a:rPr>
-              <a:t>Sanitizes input into unsafe C helpers</a:t>
-            </a:r>
-          </a:p>
-          <a:p>
-            <a:pPr marL="1028645" lvl="1" indent="-571500">
-              <a:buFont typeface="Arial" panose="020B0604020202020204" pitchFamily="34" charset="0"/>
-              <a:buChar char="•"/>
-            </a:pPr>
-            <a:r>
-              <a:rPr lang="en-US" sz="4000" dirty="0">
-                <a:latin typeface="Arial" panose="020B0604020202020204" pitchFamily="34" charset="0"/>
-                <a:cs typeface="Arial" panose="020B0604020202020204" pitchFamily="34" charset="0"/>
-              </a:rPr>
-              <a:t>e.g., Use Rust reference to </a:t>
-            </a:r>
-            <a:r>
-              <a:rPr lang="en-US" sz="4000" dirty="0" err="1">
-                <a:latin typeface="Arial" panose="020B0604020202020204" pitchFamily="34" charset="0"/>
-                <a:cs typeface="Arial" panose="020B0604020202020204" pitchFamily="34" charset="0"/>
-              </a:rPr>
-              <a:t>gurantee</a:t>
-            </a:r>
-            <a:r>
-              <a:rPr lang="en-US" sz="4000" dirty="0">
-                <a:latin typeface="Arial" panose="020B0604020202020204" pitchFamily="34" charset="0"/>
-                <a:cs typeface="Arial" panose="020B0604020202020204" pitchFamily="34" charset="0"/>
-              </a:rPr>
-              <a:t> a non-null pointer</a:t>
-            </a:r>
-          </a:p>
-        </p:txBody>
-      </p:sp>
-      <p:grpSp>
-        <p:nvGrpSpPr>
-          <p:cNvPr id="31" name="Group 30">
+              <a:t> on all execution path</a:t>
+            </a:r>
+          </a:p>
+        </p:txBody>
+      </p:sp>
+      <p:pic>
+        <p:nvPicPr>
+          <p:cNvPr id="3" name="Graphic 2">
             <a:extLst>
               <a:ext uri="{FF2B5EF4-FFF2-40B4-BE49-F238E27FC236}">
-                <a16:creationId xmlns:a16="http://schemas.microsoft.com/office/drawing/2014/main" id="{954E6EFB-DA07-EA0F-607C-218C3B5BA750}"/>
+                <a16:creationId xmlns:a16="http://schemas.microsoft.com/office/drawing/2014/main" id="{09BF2021-03AF-38AD-BCC4-3FE1F17E9BCB}"/>
               </a:ext>
             </a:extLst>
           </p:cNvPr>
-          <p:cNvGrpSpPr/>
+          <p:cNvPicPr>
+            <a:picLocks noChangeAspect="1"/>
+          </p:cNvPicPr>
           <p:nvPr/>
-        </p:nvGrpSpPr>
-        <p:grpSpPr>
-          <a:xfrm>
-            <a:off x="22010911" y="15775625"/>
-            <a:ext cx="9842710" cy="962661"/>
-            <a:chOff x="2050473" y="5070762"/>
-            <a:chExt cx="7509164" cy="962661"/>
-          </a:xfrm>
-        </p:grpSpPr>
-        <p:sp>
-          <p:nvSpPr>
-            <p:cNvPr id="32" name="Rectangle 31">
-              <a:extLst>
-                <a:ext uri="{FF2B5EF4-FFF2-40B4-BE49-F238E27FC236}">
-                  <a16:creationId xmlns:a16="http://schemas.microsoft.com/office/drawing/2014/main" id="{08B2D6E8-DB3F-5A31-4787-6837107FFB17}"/>
-                </a:ext>
-              </a:extLst>
-            </p:cNvPr>
-            <p:cNvSpPr/>
-            <p:nvPr/>
-          </p:nvSpPr>
-          <p:spPr>
-            <a:xfrm>
-              <a:off x="2050473" y="5070762"/>
-              <a:ext cx="7509164" cy="962661"/>
-            </a:xfrm>
-            <a:prstGeom prst="rect">
-              <a:avLst/>
-            </a:prstGeom>
-            <a:solidFill>
-              <a:srgbClr val="7B2841"/>
-            </a:solidFill>
-          </p:spPr>
-          <p:style>
-            <a:lnRef idx="2">
-              <a:schemeClr val="accent1">
-                <a:shade val="50000"/>
-              </a:schemeClr>
-            </a:lnRef>
-            <a:fillRef idx="1">
-              <a:schemeClr val="accent1"/>
-            </a:fillRef>
-            <a:effectRef idx="0">
-              <a:schemeClr val="accent1"/>
-            </a:effectRef>
-            <a:fontRef idx="minor">
-              <a:schemeClr val="lt1"/>
-            </a:fontRef>
-          </p:style>
-          <p:txBody>
-            <a:bodyPr rtlCol="0" anchor="ctr"/>
-            <a:lstStyle/>
-            <a:p>
-              <a:pPr algn="ctr"/>
-              <a:endParaRPr lang="en-US"/>
-            </a:p>
-          </p:txBody>
-        </p:sp>
-        <p:sp>
-          <p:nvSpPr>
-            <p:cNvPr id="33" name="TextBox 32">
-              <a:extLst>
-                <a:ext uri="{FF2B5EF4-FFF2-40B4-BE49-F238E27FC236}">
-                  <a16:creationId xmlns:a16="http://schemas.microsoft.com/office/drawing/2014/main" id="{D01A33B2-A8D1-ED93-8B21-2F49DD404D01}"/>
-                </a:ext>
-              </a:extLst>
-            </p:cNvPr>
-            <p:cNvSpPr txBox="1"/>
-            <p:nvPr/>
-          </p:nvSpPr>
-          <p:spPr>
-            <a:xfrm>
-              <a:off x="2050473" y="5167371"/>
-              <a:ext cx="7509164" cy="769441"/>
-            </a:xfrm>
-            <a:prstGeom prst="rect">
-              <a:avLst/>
-            </a:prstGeom>
-            <a:noFill/>
-          </p:spPr>
-          <p:txBody>
-            <a:bodyPr wrap="square" rtlCol="0">
-              <a:spAutoFit/>
-            </a:bodyPr>
-            <a:lstStyle/>
-            <a:p>
-              <a:r>
-                <a:rPr lang="en-US" sz="4400" b="1" dirty="0">
-                  <a:solidFill>
-                    <a:schemeClr val="bg1"/>
-                  </a:solidFill>
-                  <a:latin typeface="Arial" panose="020B0604020202020204" pitchFamily="34" charset="0"/>
-                  <a:cs typeface="Arial" panose="020B0604020202020204" pitchFamily="34" charset="0"/>
-                </a:rPr>
-                <a:t>  Conclusion</a:t>
-              </a:r>
-            </a:p>
-          </p:txBody>
-        </p:sp>
-      </p:grpSp>
-      <p:sp>
-        <p:nvSpPr>
-          <p:cNvPr id="34" name="TextBox 33">
+        </p:nvPicPr>
+        <p:blipFill rotWithShape="1">
+          <a:blip r:embed="rId4">
             <a:extLst>
-              <a:ext uri="{FF2B5EF4-FFF2-40B4-BE49-F238E27FC236}">
-                <a16:creationId xmlns:a16="http://schemas.microsoft.com/office/drawing/2014/main" id="{14E134CD-AD90-1DCF-277B-5154147BC430}"/>
+              <a:ext uri="{96DAC541-7B7A-43D3-8B79-37D633B846F1}">
+                <asvg:svgBlip xmlns:asvg="http://schemas.microsoft.com/office/drawing/2016/SVG/main" r:embed="rId5"/>
               </a:ext>
             </a:extLst>
-          </p:cNvPr>
-          <p:cNvSpPr txBox="1"/>
-          <p:nvPr/>
-        </p:nvSpPr>
+          </a:blip>
+          <a:srcRect t="32587" b="28434"/>
+          <a:stretch/>
+        </p:blipFill>
         <p:spPr>
           <a:xfrm>
-            <a:off x="22010911" y="16738284"/>
-            <a:ext cx="9842710" cy="4401205"/>
+            <a:off x="8862951" y="1929532"/>
+            <a:ext cx="3654527" cy="1424476"/>
           </a:xfrm>
           <a:prstGeom prst="rect">
             <a:avLst/>
           </a:prstGeom>
-          <a:noFill/>
         </p:spPr>
-        <p:txBody>
-          <a:bodyPr wrap="square" rtlCol="0">
-            <a:spAutoFit/>
-          </a:bodyPr>
-          <a:lstStyle/>
-          <a:p>
-            <a:pPr marL="571500" indent="-571500">
-              <a:buFont typeface="Arial" panose="020B0604020202020204" pitchFamily="34" charset="0"/>
-              <a:buChar char="•"/>
-            </a:pPr>
-            <a:r>
-              <a:rPr lang="en-US" sz="4000" dirty="0">
-                <a:latin typeface="Arial" panose="020B0604020202020204" pitchFamily="34" charset="0"/>
-                <a:cs typeface="Arial" panose="020B0604020202020204" pitchFamily="34" charset="0"/>
-              </a:rPr>
-              <a:t>The problem of the </a:t>
-            </a:r>
-            <a:r>
-              <a:rPr lang="en-US" sz="4000" dirty="0" err="1">
-                <a:latin typeface="Arial" panose="020B0604020202020204" pitchFamily="34" charset="0"/>
-                <a:cs typeface="Arial" panose="020B0604020202020204" pitchFamily="34" charset="0"/>
-              </a:rPr>
-              <a:t>eBPF</a:t>
-            </a:r>
-            <a:r>
-              <a:rPr lang="en-US" sz="4000" dirty="0">
-                <a:latin typeface="Arial" panose="020B0604020202020204" pitchFamily="34" charset="0"/>
-                <a:cs typeface="Arial" panose="020B0604020202020204" pitchFamily="34" charset="0"/>
-              </a:rPr>
-              <a:t> verifier makes kernel verification untenable.</a:t>
-            </a:r>
-          </a:p>
-          <a:p>
-            <a:pPr marL="571500" indent="-571500">
-              <a:buFont typeface="Arial" panose="020B0604020202020204" pitchFamily="34" charset="0"/>
-              <a:buChar char="•"/>
-            </a:pPr>
-            <a:r>
-              <a:rPr lang="en-US" sz="4000" dirty="0">
-                <a:latin typeface="Arial" panose="020B0604020202020204" pitchFamily="34" charset="0"/>
-                <a:cs typeface="Arial" panose="020B0604020202020204" pitchFamily="34" charset="0"/>
-              </a:rPr>
-              <a:t>We propose the Inner-</a:t>
-            </a:r>
-            <a:r>
-              <a:rPr lang="en-US" sz="4000" dirty="0" err="1">
-                <a:latin typeface="Arial" panose="020B0604020202020204" pitchFamily="34" charset="0"/>
-                <a:cs typeface="Arial" panose="020B0604020202020204" pitchFamily="34" charset="0"/>
-              </a:rPr>
-              <a:t>unikernels</a:t>
-            </a:r>
-            <a:r>
-              <a:rPr lang="en-US" sz="4000" dirty="0">
-                <a:latin typeface="Arial" panose="020B0604020202020204" pitchFamily="34" charset="0"/>
-                <a:cs typeface="Arial" panose="020B0604020202020204" pitchFamily="34" charset="0"/>
-              </a:rPr>
-              <a:t>, which uses Rust as the programming language and leverages a combination of language properties and runtime mechanisms to guarantee safety.</a:t>
-            </a:r>
-          </a:p>
-        </p:txBody>
-      </p:sp>
+      </p:pic>
       <p:pic>
         <p:nvPicPr>
           <p:cNvPr id="2" name="Picture 14" descr="University logo and wordmark – Office of Strategic Marketing and Branding">
@@ -4517,7 +4624,7 @@
           <p:nvPr/>
         </p:nvPicPr>
         <p:blipFill>
-          <a:blip r:embed="rId4">
+          <a:blip r:embed="rId6">
             <a:extLst>
               <a:ext uri="{28A0092B-C50C-407E-A947-70E740481C1C}">
                 <a14:useLocalDpi xmlns:a14="http://schemas.microsoft.com/office/drawing/2010/main" val="0"/>
@@ -4531,8 +4638,8 @@
         </p:blipFill>
         <p:spPr bwMode="auto">
           <a:xfrm>
-            <a:off x="1064779" y="1963719"/>
-            <a:ext cx="3501263" cy="1446550"/>
+            <a:off x="4853425" y="1719901"/>
+            <a:ext cx="4388660" cy="1813179"/>
           </a:xfrm>
           <a:prstGeom prst="rect">
             <a:avLst/>
@@ -4547,41 +4654,6 @@
               </a14:hiddenFill>
             </a:ext>
           </a:extLst>
-        </p:spPr>
-      </p:pic>
-      <p:pic>
-        <p:nvPicPr>
-          <p:cNvPr id="3" name="Graphic 2">
-            <a:extLst>
-              <a:ext uri="{FF2B5EF4-FFF2-40B4-BE49-F238E27FC236}">
-                <a16:creationId xmlns:a16="http://schemas.microsoft.com/office/drawing/2014/main" id="{09BF2021-03AF-38AD-BCC4-3FE1F17E9BCB}"/>
-              </a:ext>
-            </a:extLst>
-          </p:cNvPr>
-          <p:cNvPicPr>
-            <a:picLocks noChangeAspect="1"/>
-          </p:cNvPicPr>
-          <p:nvPr/>
-        </p:nvPicPr>
-        <p:blipFill rotWithShape="1">
-          <a:blip r:embed="rId5">
-            <a:extLst>
-              <a:ext uri="{96DAC541-7B7A-43D3-8B79-37D633B846F1}">
-                <asvg:svgBlip xmlns:asvg="http://schemas.microsoft.com/office/drawing/2016/SVG/main" r:embed="rId6"/>
-              </a:ext>
-            </a:extLst>
-          </a:blip>
-          <a:srcRect t="32587" b="28434"/>
-          <a:stretch/>
-        </p:blipFill>
-        <p:spPr>
-          <a:xfrm>
-            <a:off x="8728480" y="1984572"/>
-            <a:ext cx="3654527" cy="1424476"/>
-          </a:xfrm>
-          <a:prstGeom prst="rect">
-            <a:avLst/>
-          </a:prstGeom>
         </p:spPr>
       </p:pic>
       <p:pic>
@@ -4611,7 +4683,7 @@
         </p:blipFill>
         <p:spPr bwMode="auto">
           <a:xfrm>
-            <a:off x="5114749" y="2007644"/>
+            <a:off x="1574617" y="1979072"/>
             <a:ext cx="3065023" cy="1424477"/>
           </a:xfrm>
           <a:prstGeom prst="rect">
@@ -4629,6 +4701,900 @@
           </a:extLst>
         </p:spPr>
       </p:pic>
+      <p:pic>
+        <p:nvPicPr>
+          <p:cNvPr id="9" name="Picture 8">
+            <a:extLst>
+              <a:ext uri="{FF2B5EF4-FFF2-40B4-BE49-F238E27FC236}">
+                <a16:creationId xmlns:a16="http://schemas.microsoft.com/office/drawing/2014/main" id="{A1035F9B-8BBF-E8E6-24BF-86105B721AA0}"/>
+              </a:ext>
+            </a:extLst>
+          </p:cNvPr>
+          <p:cNvPicPr>
+            <a:picLocks noChangeAspect="1"/>
+          </p:cNvPicPr>
+          <p:nvPr/>
+        </p:nvPicPr>
+        <p:blipFill>
+          <a:blip r:embed="rId8"/>
+          <a:stretch>
+            <a:fillRect/>
+          </a:stretch>
+        </p:blipFill>
+        <p:spPr>
+          <a:xfrm>
+            <a:off x="1064779" y="15209823"/>
+            <a:ext cx="5094868" cy="3056921"/>
+          </a:xfrm>
+          <a:prstGeom prst="rect">
+            <a:avLst/>
+          </a:prstGeom>
+        </p:spPr>
+      </p:pic>
+      <p:pic>
+        <p:nvPicPr>
+          <p:cNvPr id="25" name="Picture 24">
+            <a:extLst>
+              <a:ext uri="{FF2B5EF4-FFF2-40B4-BE49-F238E27FC236}">
+                <a16:creationId xmlns:a16="http://schemas.microsoft.com/office/drawing/2014/main" id="{F10F56D5-C0E8-5341-692B-39053814DDE5}"/>
+              </a:ext>
+            </a:extLst>
+          </p:cNvPr>
+          <p:cNvPicPr>
+            <a:picLocks noChangeAspect="1"/>
+          </p:cNvPicPr>
+          <p:nvPr/>
+        </p:nvPicPr>
+        <p:blipFill>
+          <a:blip r:embed="rId9"/>
+          <a:stretch>
+            <a:fillRect/>
+          </a:stretch>
+        </p:blipFill>
+        <p:spPr>
+          <a:xfrm>
+            <a:off x="5986134" y="15209823"/>
+            <a:ext cx="5094868" cy="3056921"/>
+          </a:xfrm>
+          <a:prstGeom prst="rect">
+            <a:avLst/>
+          </a:prstGeom>
+        </p:spPr>
+      </p:pic>
+      <p:pic>
+        <p:nvPicPr>
+          <p:cNvPr id="36" name="Picture 35">
+            <a:extLst>
+              <a:ext uri="{FF2B5EF4-FFF2-40B4-BE49-F238E27FC236}">
+                <a16:creationId xmlns:a16="http://schemas.microsoft.com/office/drawing/2014/main" id="{B0EBA10A-C9EC-BFCD-32A6-C795E938DCB0}"/>
+              </a:ext>
+            </a:extLst>
+          </p:cNvPr>
+          <p:cNvPicPr>
+            <a:picLocks noChangeAspect="1"/>
+          </p:cNvPicPr>
+          <p:nvPr/>
+        </p:nvPicPr>
+        <p:blipFill>
+          <a:blip r:embed="rId10"/>
+          <a:stretch>
+            <a:fillRect/>
+          </a:stretch>
+        </p:blipFill>
+        <p:spPr>
+          <a:xfrm>
+            <a:off x="1064779" y="18131750"/>
+            <a:ext cx="9842710" cy="3444949"/>
+          </a:xfrm>
+          <a:prstGeom prst="rect">
+            <a:avLst/>
+          </a:prstGeom>
+        </p:spPr>
+      </p:pic>
+      <p:sp>
+        <p:nvSpPr>
+          <p:cNvPr id="37" name="TextBox 36">
+            <a:extLst>
+              <a:ext uri="{FF2B5EF4-FFF2-40B4-BE49-F238E27FC236}">
+                <a16:creationId xmlns:a16="http://schemas.microsoft.com/office/drawing/2014/main" id="{0ED10CD2-0170-039C-32EB-C9ACABCC72F0}"/>
+              </a:ext>
+            </a:extLst>
+          </p:cNvPr>
+          <p:cNvSpPr txBox="1"/>
+          <p:nvPr/>
+        </p:nvSpPr>
+        <p:spPr>
+          <a:xfrm>
+            <a:off x="22010910" y="7347100"/>
+            <a:ext cx="9842709" cy="5509200"/>
+          </a:xfrm>
+          <a:prstGeom prst="rect">
+            <a:avLst/>
+          </a:prstGeom>
+          <a:noFill/>
+        </p:spPr>
+        <p:txBody>
+          <a:bodyPr wrap="square" rtlCol="0">
+            <a:spAutoFit/>
+          </a:bodyPr>
+          <a:lstStyle/>
+          <a:p>
+            <a:r>
+              <a:rPr lang="en-US" sz="3200" dirty="0">
+                <a:latin typeface="Consolas" panose="020B0609020204030204" pitchFamily="49" charset="0"/>
+                <a:cs typeface="Consolas" panose="020B0609020204030204" pitchFamily="49" charset="0"/>
+              </a:rPr>
+              <a:t>int </a:t>
+            </a:r>
+            <a:r>
+              <a:rPr lang="en-US" sz="3200" dirty="0">
+                <a:solidFill>
+                  <a:srgbClr val="0070C0"/>
+                </a:solidFill>
+                <a:latin typeface="Consolas" panose="020B0609020204030204" pitchFamily="49" charset="0"/>
+                <a:cs typeface="Consolas" panose="020B0609020204030204" pitchFamily="49" charset="0"/>
+              </a:rPr>
+              <a:t>bpf_prog1</a:t>
+            </a:r>
+            <a:r>
+              <a:rPr lang="en-US" sz="3200" dirty="0">
+                <a:latin typeface="Consolas" panose="020B0609020204030204" pitchFamily="49" charset="0"/>
+                <a:cs typeface="Consolas" panose="020B0609020204030204" pitchFamily="49" charset="0"/>
+              </a:rPr>
+              <a:t>(void </a:t>
+            </a:r>
+            <a:r>
+              <a:rPr lang="en-US" sz="3200" dirty="0">
+                <a:solidFill>
+                  <a:srgbClr val="0070C0"/>
+                </a:solidFill>
+                <a:latin typeface="Consolas" panose="020B0609020204030204" pitchFamily="49" charset="0"/>
+                <a:cs typeface="Consolas" panose="020B0609020204030204" pitchFamily="49" charset="0"/>
+              </a:rPr>
+              <a:t>*</a:t>
+            </a:r>
+            <a:r>
+              <a:rPr lang="en-US" sz="3200" dirty="0" err="1">
+                <a:latin typeface="Consolas" panose="020B0609020204030204" pitchFamily="49" charset="0"/>
+                <a:cs typeface="Consolas" panose="020B0609020204030204" pitchFamily="49" charset="0"/>
+              </a:rPr>
+              <a:t>ctx</a:t>
+            </a:r>
+            <a:r>
+              <a:rPr lang="en-US" sz="3200" dirty="0">
+                <a:latin typeface="Consolas" panose="020B0609020204030204" pitchFamily="49" charset="0"/>
+                <a:cs typeface="Consolas" panose="020B0609020204030204" pitchFamily="49" charset="0"/>
+              </a:rPr>
+              <a:t>)</a:t>
+            </a:r>
+          </a:p>
+          <a:p>
+            <a:r>
+              <a:rPr lang="en-US" sz="3200" dirty="0">
+                <a:latin typeface="Consolas" panose="020B0609020204030204" pitchFamily="49" charset="0"/>
+                <a:cs typeface="Consolas" panose="020B0609020204030204" pitchFamily="49" charset="0"/>
+              </a:rPr>
+              <a:t>{</a:t>
+            </a:r>
+          </a:p>
+          <a:p>
+            <a:r>
+              <a:rPr lang="en-US" sz="3200" dirty="0">
+                <a:latin typeface="Consolas" panose="020B0609020204030204" pitchFamily="49" charset="0"/>
+                <a:cs typeface="Consolas" panose="020B0609020204030204" pitchFamily="49" charset="0"/>
+              </a:rPr>
+              <a:t>  </a:t>
+            </a:r>
+            <a:r>
+              <a:rPr lang="en-US" sz="3200" dirty="0" err="1">
+                <a:solidFill>
+                  <a:srgbClr val="0070C0"/>
+                </a:solidFill>
+                <a:latin typeface="Consolas" panose="020B0609020204030204" pitchFamily="49" charset="0"/>
+                <a:cs typeface="Consolas" panose="020B0609020204030204" pitchFamily="49" charset="0"/>
+              </a:rPr>
+              <a:t>bpf_spin_lock</a:t>
+            </a:r>
+            <a:r>
+              <a:rPr lang="en-US" sz="3200" dirty="0">
+                <a:latin typeface="Consolas" panose="020B0609020204030204" pitchFamily="49" charset="0"/>
+                <a:cs typeface="Consolas" panose="020B0609020204030204" pitchFamily="49" charset="0"/>
+              </a:rPr>
+              <a:t>(l);</a:t>
+            </a:r>
+          </a:p>
+          <a:p>
+            <a:r>
+              <a:rPr lang="en-US" sz="3200" dirty="0">
+                <a:latin typeface="Consolas" panose="020B0609020204030204" pitchFamily="49" charset="0"/>
+                <a:cs typeface="Consolas" panose="020B0609020204030204" pitchFamily="49" charset="0"/>
+              </a:rPr>
+              <a:t>  </a:t>
+            </a:r>
+            <a:r>
+              <a:rPr lang="en-US" sz="3200" dirty="0">
+                <a:solidFill>
+                  <a:schemeClr val="accent2">
+                    <a:lumMod val="50000"/>
+                  </a:schemeClr>
+                </a:solidFill>
+                <a:latin typeface="Consolas" panose="020B0609020204030204" pitchFamily="49" charset="0"/>
+                <a:cs typeface="Consolas" panose="020B0609020204030204" pitchFamily="49" charset="0"/>
+              </a:rPr>
+              <a:t>if</a:t>
+            </a:r>
+            <a:r>
+              <a:rPr lang="en-US" sz="3200" dirty="0">
+                <a:latin typeface="Consolas" panose="020B0609020204030204" pitchFamily="49" charset="0"/>
+                <a:cs typeface="Consolas" panose="020B0609020204030204" pitchFamily="49" charset="0"/>
+              </a:rPr>
+              <a:t> (</a:t>
+            </a:r>
+            <a:r>
+              <a:rPr lang="en-US" sz="3200" dirty="0" err="1">
+                <a:latin typeface="Consolas" panose="020B0609020204030204" pitchFamily="49" charset="0"/>
+                <a:cs typeface="Consolas" panose="020B0609020204030204" pitchFamily="49" charset="0"/>
+              </a:rPr>
+              <a:t>some_cond</a:t>
+            </a:r>
+            <a:r>
+              <a:rPr lang="en-US" sz="3200" dirty="0">
+                <a:latin typeface="Consolas" panose="020B0609020204030204" pitchFamily="49" charset="0"/>
+                <a:cs typeface="Consolas" panose="020B0609020204030204" pitchFamily="49" charset="0"/>
+              </a:rPr>
+              <a:t>) {</a:t>
+            </a:r>
+          </a:p>
+          <a:p>
+            <a:r>
+              <a:rPr lang="en-US" sz="3200" dirty="0">
+                <a:latin typeface="Consolas" panose="020B0609020204030204" pitchFamily="49" charset="0"/>
+                <a:cs typeface="Consolas" panose="020B0609020204030204" pitchFamily="49" charset="0"/>
+              </a:rPr>
+              <a:t>    </a:t>
+            </a:r>
+            <a:r>
+              <a:rPr lang="en-US" sz="3200" dirty="0" err="1">
+                <a:solidFill>
+                  <a:srgbClr val="0070C0"/>
+                </a:solidFill>
+                <a:latin typeface="Consolas" panose="020B0609020204030204" pitchFamily="49" charset="0"/>
+                <a:cs typeface="Consolas" panose="020B0609020204030204" pitchFamily="49" charset="0"/>
+              </a:rPr>
+              <a:t>bpf_spin_unlock</a:t>
+            </a:r>
+            <a:r>
+              <a:rPr lang="en-US" sz="3200" dirty="0">
+                <a:latin typeface="Consolas" panose="020B0609020204030204" pitchFamily="49" charset="0"/>
+                <a:cs typeface="Consolas" panose="020B0609020204030204" pitchFamily="49" charset="0"/>
+              </a:rPr>
+              <a:t>();</a:t>
+            </a:r>
+          </a:p>
+          <a:p>
+            <a:r>
+              <a:rPr lang="en-US" sz="3200" dirty="0">
+                <a:latin typeface="Consolas" panose="020B0609020204030204" pitchFamily="49" charset="0"/>
+                <a:cs typeface="Consolas" panose="020B0609020204030204" pitchFamily="49" charset="0"/>
+              </a:rPr>
+              <a:t>    </a:t>
+            </a:r>
+            <a:r>
+              <a:rPr lang="en-US" sz="3200" dirty="0">
+                <a:solidFill>
+                  <a:schemeClr val="accent2">
+                    <a:lumMod val="50000"/>
+                  </a:schemeClr>
+                </a:solidFill>
+                <a:latin typeface="Consolas" panose="020B0609020204030204" pitchFamily="49" charset="0"/>
+                <a:cs typeface="Consolas" panose="020B0609020204030204" pitchFamily="49" charset="0"/>
+              </a:rPr>
+              <a:t>return</a:t>
+            </a:r>
+            <a:r>
+              <a:rPr lang="en-US" sz="3200" dirty="0">
+                <a:latin typeface="Consolas" panose="020B0609020204030204" pitchFamily="49" charset="0"/>
+                <a:cs typeface="Consolas" panose="020B0609020204030204" pitchFamily="49" charset="0"/>
+              </a:rPr>
+              <a:t> </a:t>
+            </a:r>
+            <a:r>
+              <a:rPr lang="en-US" sz="3200" dirty="0">
+                <a:solidFill>
+                  <a:srgbClr val="0070C0"/>
+                </a:solidFill>
+                <a:latin typeface="Consolas" panose="020B0609020204030204" pitchFamily="49" charset="0"/>
+                <a:cs typeface="Consolas" panose="020B0609020204030204" pitchFamily="49" charset="0"/>
+              </a:rPr>
+              <a:t>0</a:t>
+            </a:r>
+            <a:r>
+              <a:rPr lang="en-US" sz="3200" dirty="0">
+                <a:latin typeface="Consolas" panose="020B0609020204030204" pitchFamily="49" charset="0"/>
+                <a:cs typeface="Consolas" panose="020B0609020204030204" pitchFamily="49" charset="0"/>
+              </a:rPr>
+              <a:t>;</a:t>
+            </a:r>
+          </a:p>
+          <a:p>
+            <a:r>
+              <a:rPr lang="en-US" sz="3200" dirty="0">
+                <a:latin typeface="Consolas" panose="020B0609020204030204" pitchFamily="49" charset="0"/>
+                <a:cs typeface="Consolas" panose="020B0609020204030204" pitchFamily="49" charset="0"/>
+              </a:rPr>
+              <a:t>  } </a:t>
+            </a:r>
+            <a:r>
+              <a:rPr lang="en-US" sz="3200" dirty="0">
+                <a:solidFill>
+                  <a:schemeClr val="accent2">
+                    <a:lumMod val="50000"/>
+                  </a:schemeClr>
+                </a:solidFill>
+                <a:latin typeface="Consolas" panose="020B0609020204030204" pitchFamily="49" charset="0"/>
+                <a:cs typeface="Consolas" panose="020B0609020204030204" pitchFamily="49" charset="0"/>
+              </a:rPr>
+              <a:t>else</a:t>
+            </a:r>
+            <a:r>
+              <a:rPr lang="en-US" sz="3200" dirty="0">
+                <a:latin typeface="Consolas" panose="020B0609020204030204" pitchFamily="49" charset="0"/>
+                <a:cs typeface="Consolas" panose="020B0609020204030204" pitchFamily="49" charset="0"/>
+              </a:rPr>
+              <a:t> {</a:t>
+            </a:r>
+          </a:p>
+          <a:p>
+            <a:r>
+              <a:rPr lang="en-US" sz="3200" dirty="0">
+                <a:latin typeface="Consolas" panose="020B0609020204030204" pitchFamily="49" charset="0"/>
+                <a:cs typeface="Consolas" panose="020B0609020204030204" pitchFamily="49" charset="0"/>
+              </a:rPr>
+              <a:t>    </a:t>
+            </a:r>
+            <a:r>
+              <a:rPr lang="en-US" sz="3200" dirty="0">
+                <a:solidFill>
+                  <a:schemeClr val="tx1">
+                    <a:lumMod val="50000"/>
+                    <a:lumOff val="50000"/>
+                  </a:schemeClr>
+                </a:solidFill>
+                <a:latin typeface="Consolas" panose="020B0609020204030204" pitchFamily="49" charset="0"/>
+                <a:cs typeface="Consolas" panose="020B0609020204030204" pitchFamily="49" charset="0"/>
+              </a:rPr>
+              <a:t>/* Not unlocked, rejected */</a:t>
+            </a:r>
+          </a:p>
+          <a:p>
+            <a:r>
+              <a:rPr lang="en-US" sz="3200" dirty="0">
+                <a:latin typeface="Consolas" panose="020B0609020204030204" pitchFamily="49" charset="0"/>
+                <a:cs typeface="Consolas" panose="020B0609020204030204" pitchFamily="49" charset="0"/>
+              </a:rPr>
+              <a:t>    </a:t>
+            </a:r>
+            <a:r>
+              <a:rPr lang="en-US" sz="3200" dirty="0">
+                <a:solidFill>
+                  <a:schemeClr val="accent2">
+                    <a:lumMod val="50000"/>
+                  </a:schemeClr>
+                </a:solidFill>
+                <a:latin typeface="Consolas" panose="020B0609020204030204" pitchFamily="49" charset="0"/>
+                <a:cs typeface="Consolas" panose="020B0609020204030204" pitchFamily="49" charset="0"/>
+              </a:rPr>
+              <a:t>return</a:t>
+            </a:r>
+            <a:r>
+              <a:rPr lang="en-US" sz="3200" dirty="0">
+                <a:latin typeface="Consolas" panose="020B0609020204030204" pitchFamily="49" charset="0"/>
+                <a:cs typeface="Consolas" panose="020B0609020204030204" pitchFamily="49" charset="0"/>
+              </a:rPr>
+              <a:t> </a:t>
+            </a:r>
+            <a:r>
+              <a:rPr lang="en-US" sz="3200" dirty="0">
+                <a:solidFill>
+                  <a:srgbClr val="0070C0"/>
+                </a:solidFill>
+                <a:latin typeface="Consolas" panose="020B0609020204030204" pitchFamily="49" charset="0"/>
+                <a:cs typeface="Consolas" panose="020B0609020204030204" pitchFamily="49" charset="0"/>
+              </a:rPr>
+              <a:t>1</a:t>
+            </a:r>
+            <a:r>
+              <a:rPr lang="en-US" sz="3200" dirty="0">
+                <a:latin typeface="Consolas" panose="020B0609020204030204" pitchFamily="49" charset="0"/>
+                <a:cs typeface="Consolas" panose="020B0609020204030204" pitchFamily="49" charset="0"/>
+              </a:rPr>
+              <a:t>;</a:t>
+            </a:r>
+          </a:p>
+          <a:p>
+            <a:r>
+              <a:rPr lang="en-US" sz="3200" dirty="0">
+                <a:latin typeface="Consolas" panose="020B0609020204030204" pitchFamily="49" charset="0"/>
+                <a:cs typeface="Consolas" panose="020B0609020204030204" pitchFamily="49" charset="0"/>
+              </a:rPr>
+              <a:t>  }</a:t>
+            </a:r>
+          </a:p>
+          <a:p>
+            <a:r>
+              <a:rPr lang="en-US" sz="3200" dirty="0">
+                <a:latin typeface="Consolas" panose="020B0609020204030204" pitchFamily="49" charset="0"/>
+                <a:cs typeface="Consolas" panose="020B0609020204030204" pitchFamily="49" charset="0"/>
+              </a:rPr>
+              <a:t>}</a:t>
+            </a:r>
+          </a:p>
+        </p:txBody>
+      </p:sp>
+      <p:sp>
+        <p:nvSpPr>
+          <p:cNvPr id="38" name="TextBox 37">
+            <a:extLst>
+              <a:ext uri="{FF2B5EF4-FFF2-40B4-BE49-F238E27FC236}">
+                <a16:creationId xmlns:a16="http://schemas.microsoft.com/office/drawing/2014/main" id="{64A59987-E99E-DD40-3979-10C78C7BB251}"/>
+              </a:ext>
+            </a:extLst>
+          </p:cNvPr>
+          <p:cNvSpPr txBox="1"/>
+          <p:nvPr/>
+        </p:nvSpPr>
+        <p:spPr>
+          <a:xfrm>
+            <a:off x="22010909" y="13085664"/>
+            <a:ext cx="9842710" cy="3170099"/>
+          </a:xfrm>
+          <a:prstGeom prst="rect">
+            <a:avLst/>
+          </a:prstGeom>
+          <a:noFill/>
+        </p:spPr>
+        <p:txBody>
+          <a:bodyPr wrap="square" rtlCol="0">
+            <a:spAutoFit/>
+          </a:bodyPr>
+          <a:lstStyle/>
+          <a:p>
+            <a:pPr marL="571500" indent="-571500">
+              <a:buFont typeface="Arial" panose="020B0604020202020204" pitchFamily="34" charset="0"/>
+              <a:buChar char="•"/>
+            </a:pPr>
+            <a:r>
+              <a:rPr lang="en-US" sz="4000" b="1" dirty="0">
+                <a:solidFill>
+                  <a:srgbClr val="D97C3A"/>
+                </a:solidFill>
+                <a:latin typeface="Arial" panose="020B0604020202020204" pitchFamily="34" charset="0"/>
+                <a:cs typeface="Arial" panose="020B0604020202020204" pitchFamily="34" charset="0"/>
+              </a:rPr>
+              <a:t>Resource-acquisition-is-initialization</a:t>
+            </a:r>
+            <a:r>
+              <a:rPr lang="en-US" sz="4000" dirty="0">
+                <a:latin typeface="Arial" panose="020B0604020202020204" pitchFamily="34" charset="0"/>
+                <a:cs typeface="Arial" panose="020B0604020202020204" pitchFamily="34" charset="0"/>
+              </a:rPr>
+              <a:t> (RAII) in Rust automatically ensures correct resource management</a:t>
+            </a:r>
+          </a:p>
+          <a:p>
+            <a:pPr marL="1028645" lvl="1" indent="-571500">
+              <a:buFont typeface="Arial" panose="020B0604020202020204" pitchFamily="34" charset="0"/>
+              <a:buChar char="•"/>
+            </a:pPr>
+            <a:r>
+              <a:rPr lang="en-US" sz="4000" dirty="0">
+                <a:latin typeface="Arial" panose="020B0604020202020204" pitchFamily="34" charset="0"/>
+                <a:cs typeface="Arial" panose="020B0604020202020204" pitchFamily="34" charset="0"/>
+              </a:rPr>
+              <a:t>Released upon object destruction</a:t>
+            </a:r>
+          </a:p>
+          <a:p>
+            <a:pPr marL="1028645" lvl="1" indent="-571500">
+              <a:buFont typeface="Arial" panose="020B0604020202020204" pitchFamily="34" charset="0"/>
+              <a:buChar char="•"/>
+            </a:pPr>
+            <a:r>
+              <a:rPr lang="en-US" sz="4000" dirty="0">
+                <a:latin typeface="Arial" panose="020B0604020202020204" pitchFamily="34" charset="0"/>
+                <a:cs typeface="Arial" panose="020B0604020202020204" pitchFamily="34" charset="0"/>
+              </a:rPr>
+              <a:t>e.g., when object goes out-of-scope</a:t>
+            </a:r>
+          </a:p>
+        </p:txBody>
+      </p:sp>
+      <p:sp>
+        <p:nvSpPr>
+          <p:cNvPr id="39" name="TextBox 38">
+            <a:extLst>
+              <a:ext uri="{FF2B5EF4-FFF2-40B4-BE49-F238E27FC236}">
+                <a16:creationId xmlns:a16="http://schemas.microsoft.com/office/drawing/2014/main" id="{BB36671E-8D8F-7F19-7D8D-1D3A2FA56E9C}"/>
+              </a:ext>
+            </a:extLst>
+          </p:cNvPr>
+          <p:cNvSpPr txBox="1"/>
+          <p:nvPr/>
+        </p:nvSpPr>
+        <p:spPr>
+          <a:xfrm>
+            <a:off x="22010909" y="16706315"/>
+            <a:ext cx="9842709" cy="4524315"/>
+          </a:xfrm>
+          <a:prstGeom prst="rect">
+            <a:avLst/>
+          </a:prstGeom>
+          <a:noFill/>
+        </p:spPr>
+        <p:txBody>
+          <a:bodyPr wrap="square" rtlCol="0">
+            <a:spAutoFit/>
+          </a:bodyPr>
+          <a:lstStyle/>
+          <a:p>
+            <a:r>
+              <a:rPr lang="en-US" sz="3200" dirty="0" err="1">
+                <a:solidFill>
+                  <a:schemeClr val="accent2">
+                    <a:lumMod val="50000"/>
+                  </a:schemeClr>
+                </a:solidFill>
+                <a:latin typeface="Consolas" panose="020B0609020204030204" pitchFamily="49" charset="0"/>
+                <a:cs typeface="Consolas" panose="020B0609020204030204" pitchFamily="49" charset="0"/>
+              </a:rPr>
+              <a:t>fn</a:t>
+            </a:r>
+            <a:r>
+              <a:rPr lang="en-US" sz="3200" dirty="0">
+                <a:latin typeface="Consolas" panose="020B0609020204030204" pitchFamily="49" charset="0"/>
+                <a:cs typeface="Consolas" panose="020B0609020204030204" pitchFamily="49" charset="0"/>
+              </a:rPr>
+              <a:t> </a:t>
+            </a:r>
+            <a:r>
+              <a:rPr lang="en-US" sz="3200" dirty="0">
+                <a:solidFill>
+                  <a:srgbClr val="0070C0"/>
+                </a:solidFill>
+                <a:latin typeface="Consolas" panose="020B0609020204030204" pitchFamily="49" charset="0"/>
+                <a:cs typeface="Consolas" panose="020B0609020204030204" pitchFamily="49" charset="0"/>
+              </a:rPr>
+              <a:t>iu_prog1</a:t>
+            </a:r>
+            <a:r>
+              <a:rPr lang="en-US" sz="3200" dirty="0">
+                <a:latin typeface="Consolas" panose="020B0609020204030204" pitchFamily="49" charset="0"/>
+                <a:cs typeface="Consolas" panose="020B0609020204030204" pitchFamily="49" charset="0"/>
+              </a:rPr>
+              <a:t>(</a:t>
+            </a:r>
+            <a:r>
+              <a:rPr lang="en-US" sz="3200" dirty="0" err="1">
+                <a:latin typeface="Consolas" panose="020B0609020204030204" pitchFamily="49" charset="0"/>
+                <a:cs typeface="Consolas" panose="020B0609020204030204" pitchFamily="49" charset="0"/>
+              </a:rPr>
+              <a:t>ctx</a:t>
+            </a:r>
+            <a:r>
+              <a:rPr lang="en-US" sz="3200" dirty="0">
+                <a:latin typeface="Consolas" panose="020B0609020204030204" pitchFamily="49" charset="0"/>
+                <a:cs typeface="Consolas" panose="020B0609020204030204" pitchFamily="49" charset="0"/>
+              </a:rPr>
+              <a:t>: </a:t>
+            </a:r>
+            <a:r>
+              <a:rPr lang="en-US" sz="3200" dirty="0">
+                <a:solidFill>
+                  <a:srgbClr val="0070C0"/>
+                </a:solidFill>
+                <a:latin typeface="Consolas" panose="020B0609020204030204" pitchFamily="49" charset="0"/>
+                <a:cs typeface="Consolas" panose="020B0609020204030204" pitchFamily="49" charset="0"/>
+              </a:rPr>
+              <a:t>*</a:t>
+            </a:r>
+            <a:r>
+              <a:rPr lang="en-US" sz="3200" dirty="0">
+                <a:solidFill>
+                  <a:schemeClr val="accent2">
+                    <a:lumMod val="50000"/>
+                  </a:schemeClr>
+                </a:solidFill>
+                <a:latin typeface="Consolas" panose="020B0609020204030204" pitchFamily="49" charset="0"/>
+                <a:cs typeface="Consolas" panose="020B0609020204030204" pitchFamily="49" charset="0"/>
+              </a:rPr>
+              <a:t>const</a:t>
+            </a:r>
+            <a:r>
+              <a:rPr lang="en-US" sz="3200" dirty="0">
+                <a:latin typeface="Consolas" panose="020B0609020204030204" pitchFamily="49" charset="0"/>
+                <a:cs typeface="Consolas" panose="020B0609020204030204" pitchFamily="49" charset="0"/>
+              </a:rPr>
+              <a:t> ()) -&gt; i32</a:t>
+            </a:r>
+          </a:p>
+          <a:p>
+            <a:r>
+              <a:rPr lang="en-US" sz="3200" dirty="0">
+                <a:latin typeface="Consolas" panose="020B0609020204030204" pitchFamily="49" charset="0"/>
+                <a:cs typeface="Consolas" panose="020B0609020204030204" pitchFamily="49" charset="0"/>
+              </a:rPr>
+              <a:t>{</a:t>
+            </a:r>
+          </a:p>
+          <a:p>
+            <a:r>
+              <a:rPr lang="en-US" sz="3200" dirty="0">
+                <a:latin typeface="Consolas" panose="020B0609020204030204" pitchFamily="49" charset="0"/>
+                <a:cs typeface="Consolas" panose="020B0609020204030204" pitchFamily="49" charset="0"/>
+              </a:rPr>
+              <a:t>  </a:t>
+            </a:r>
+            <a:r>
+              <a:rPr lang="en-US" sz="3200" dirty="0">
+                <a:solidFill>
+                  <a:schemeClr val="accent2">
+                    <a:lumMod val="50000"/>
+                  </a:schemeClr>
+                </a:solidFill>
+                <a:latin typeface="Consolas" panose="020B0609020204030204" pitchFamily="49" charset="0"/>
+                <a:cs typeface="Consolas" panose="020B0609020204030204" pitchFamily="49" charset="0"/>
+              </a:rPr>
+              <a:t>let</a:t>
+            </a:r>
+            <a:r>
+              <a:rPr lang="en-US" sz="3200" dirty="0">
+                <a:latin typeface="Consolas" panose="020B0609020204030204" pitchFamily="49" charset="0"/>
+                <a:cs typeface="Consolas" panose="020B0609020204030204" pitchFamily="49" charset="0"/>
+              </a:rPr>
+              <a:t> </a:t>
+            </a:r>
+            <a:r>
+              <a:rPr lang="en-US" sz="3200" dirty="0">
+                <a:solidFill>
+                  <a:schemeClr val="accent2">
+                    <a:lumMod val="50000"/>
+                  </a:schemeClr>
+                </a:solidFill>
+                <a:latin typeface="Consolas" panose="020B0609020204030204" pitchFamily="49" charset="0"/>
+                <a:cs typeface="Consolas" panose="020B0609020204030204" pitchFamily="49" charset="0"/>
+              </a:rPr>
+              <a:t>mut</a:t>
+            </a:r>
+            <a:r>
+              <a:rPr lang="en-US" sz="3200" dirty="0">
+                <a:latin typeface="Consolas" panose="020B0609020204030204" pitchFamily="49" charset="0"/>
+                <a:cs typeface="Consolas" panose="020B0609020204030204" pitchFamily="49" charset="0"/>
+              </a:rPr>
+              <a:t> guard = </a:t>
+            </a:r>
+            <a:r>
+              <a:rPr lang="en-US" sz="3200" dirty="0" err="1">
+                <a:latin typeface="Consolas" panose="020B0609020204030204" pitchFamily="49" charset="0"/>
+                <a:cs typeface="Consolas" panose="020B0609020204030204" pitchFamily="49" charset="0"/>
+              </a:rPr>
+              <a:t>spin_lock_guard</a:t>
+            </a:r>
+            <a:r>
+              <a:rPr lang="en-US" sz="3200" dirty="0">
+                <a:latin typeface="Consolas" panose="020B0609020204030204" pitchFamily="49" charset="0"/>
+                <a:cs typeface="Consolas" panose="020B0609020204030204" pitchFamily="49" charset="0"/>
+              </a:rPr>
+              <a:t>::</a:t>
+            </a:r>
+            <a:r>
+              <a:rPr lang="en-US" sz="3200" dirty="0">
+                <a:solidFill>
+                  <a:srgbClr val="0070C0"/>
+                </a:solidFill>
+                <a:latin typeface="Consolas" panose="020B0609020204030204" pitchFamily="49" charset="0"/>
+                <a:cs typeface="Consolas" panose="020B0609020204030204" pitchFamily="49" charset="0"/>
+              </a:rPr>
+              <a:t>new</a:t>
+            </a:r>
+            <a:r>
+              <a:rPr lang="en-US" sz="3200" dirty="0">
+                <a:latin typeface="Consolas" panose="020B0609020204030204" pitchFamily="49" charset="0"/>
+                <a:cs typeface="Consolas" panose="020B0609020204030204" pitchFamily="49" charset="0"/>
+              </a:rPr>
+              <a:t>(l);</a:t>
+            </a:r>
+          </a:p>
+          <a:p>
+            <a:r>
+              <a:rPr lang="en-US" sz="3200" dirty="0">
+                <a:latin typeface="Consolas" panose="020B0609020204030204" pitchFamily="49" charset="0"/>
+                <a:cs typeface="Consolas" panose="020B0609020204030204" pitchFamily="49" charset="0"/>
+              </a:rPr>
+              <a:t>  </a:t>
+            </a:r>
+            <a:r>
+              <a:rPr lang="en-US" sz="3200" dirty="0" err="1">
+                <a:latin typeface="Consolas" panose="020B0609020204030204" pitchFamily="49" charset="0"/>
+                <a:cs typeface="Consolas" panose="020B0609020204030204" pitchFamily="49" charset="0"/>
+              </a:rPr>
+              <a:t>guard.</a:t>
+            </a:r>
+            <a:r>
+              <a:rPr lang="en-US" sz="3200" dirty="0" err="1">
+                <a:solidFill>
+                  <a:srgbClr val="0070C0"/>
+                </a:solidFill>
+                <a:latin typeface="Consolas" panose="020B0609020204030204" pitchFamily="49" charset="0"/>
+                <a:cs typeface="Consolas" panose="020B0609020204030204" pitchFamily="49" charset="0"/>
+              </a:rPr>
+              <a:t>lock</a:t>
+            </a:r>
+            <a:r>
+              <a:rPr lang="en-US" sz="3200" dirty="0">
+                <a:latin typeface="Consolas" panose="020B0609020204030204" pitchFamily="49" charset="0"/>
+                <a:cs typeface="Consolas" panose="020B0609020204030204" pitchFamily="49" charset="0"/>
+              </a:rPr>
+              <a:t>();</a:t>
+            </a:r>
+          </a:p>
+          <a:p>
+            <a:r>
+              <a:rPr lang="en-US" sz="3200" dirty="0">
+                <a:latin typeface="Consolas" panose="020B0609020204030204" pitchFamily="49" charset="0"/>
+                <a:cs typeface="Consolas" panose="020B0609020204030204" pitchFamily="49" charset="0"/>
+              </a:rPr>
+              <a:t>  </a:t>
+            </a:r>
+            <a:r>
+              <a:rPr lang="en-US" sz="3200" dirty="0">
+                <a:solidFill>
+                  <a:schemeClr val="accent2">
+                    <a:lumMod val="50000"/>
+                  </a:schemeClr>
+                </a:solidFill>
+                <a:latin typeface="Consolas" panose="020B0609020204030204" pitchFamily="49" charset="0"/>
+                <a:cs typeface="Consolas" panose="020B0609020204030204" pitchFamily="49" charset="0"/>
+              </a:rPr>
+              <a:t>if</a:t>
+            </a:r>
+            <a:r>
+              <a:rPr lang="en-US" sz="3200" dirty="0">
+                <a:latin typeface="Consolas" panose="020B0609020204030204" pitchFamily="49" charset="0"/>
+                <a:cs typeface="Consolas" panose="020B0609020204030204" pitchFamily="49" charset="0"/>
+              </a:rPr>
+              <a:t> </a:t>
+            </a:r>
+            <a:r>
+              <a:rPr lang="en-US" sz="3200" dirty="0" err="1">
+                <a:latin typeface="Consolas" panose="020B0609020204030204" pitchFamily="49" charset="0"/>
+                <a:cs typeface="Consolas" panose="020B0609020204030204" pitchFamily="49" charset="0"/>
+              </a:rPr>
+              <a:t>some_cond</a:t>
+            </a:r>
+            <a:r>
+              <a:rPr lang="en-US" sz="3200" dirty="0">
+                <a:latin typeface="Consolas" panose="020B0609020204030204" pitchFamily="49" charset="0"/>
+                <a:cs typeface="Consolas" panose="020B0609020204030204" pitchFamily="49" charset="0"/>
+              </a:rPr>
+              <a:t> { </a:t>
+            </a:r>
+            <a:r>
+              <a:rPr lang="en-US" sz="3200" dirty="0">
+                <a:solidFill>
+                  <a:srgbClr val="0070C0"/>
+                </a:solidFill>
+                <a:latin typeface="Consolas" panose="020B0609020204030204" pitchFamily="49" charset="0"/>
+                <a:cs typeface="Consolas" panose="020B0609020204030204" pitchFamily="49" charset="0"/>
+              </a:rPr>
+              <a:t>0</a:t>
+            </a:r>
+            <a:r>
+              <a:rPr lang="en-US" sz="3200" dirty="0">
+                <a:latin typeface="Consolas" panose="020B0609020204030204" pitchFamily="49" charset="0"/>
+                <a:cs typeface="Consolas" panose="020B0609020204030204" pitchFamily="49" charset="0"/>
+              </a:rPr>
+              <a:t> } </a:t>
+            </a:r>
+            <a:r>
+              <a:rPr lang="en-US" sz="3200" dirty="0">
+                <a:solidFill>
+                  <a:schemeClr val="accent2">
+                    <a:lumMod val="50000"/>
+                  </a:schemeClr>
+                </a:solidFill>
+                <a:latin typeface="Consolas" panose="020B0609020204030204" pitchFamily="49" charset="0"/>
+                <a:cs typeface="Consolas" panose="020B0609020204030204" pitchFamily="49" charset="0"/>
+              </a:rPr>
+              <a:t>else</a:t>
+            </a:r>
+            <a:r>
+              <a:rPr lang="en-US" sz="3200" dirty="0">
+                <a:latin typeface="Consolas" panose="020B0609020204030204" pitchFamily="49" charset="0"/>
+                <a:cs typeface="Consolas" panose="020B0609020204030204" pitchFamily="49" charset="0"/>
+              </a:rPr>
+              <a:t> { </a:t>
+            </a:r>
+            <a:r>
+              <a:rPr lang="en-US" sz="3200" dirty="0">
+                <a:solidFill>
+                  <a:srgbClr val="0070C0"/>
+                </a:solidFill>
+                <a:latin typeface="Consolas" panose="020B0609020204030204" pitchFamily="49" charset="0"/>
+                <a:cs typeface="Consolas" panose="020B0609020204030204" pitchFamily="49" charset="0"/>
+              </a:rPr>
+              <a:t>1</a:t>
+            </a:r>
+            <a:r>
+              <a:rPr lang="en-US" sz="3200" dirty="0">
+                <a:latin typeface="Consolas" panose="020B0609020204030204" pitchFamily="49" charset="0"/>
+                <a:cs typeface="Consolas" panose="020B0609020204030204" pitchFamily="49" charset="0"/>
+              </a:rPr>
+              <a:t> }</a:t>
+            </a:r>
+          </a:p>
+          <a:p>
+            <a:r>
+              <a:rPr lang="en-US" sz="3200" dirty="0">
+                <a:latin typeface="Consolas" panose="020B0609020204030204" pitchFamily="49" charset="0"/>
+                <a:cs typeface="Consolas" panose="020B0609020204030204" pitchFamily="49" charset="0"/>
+              </a:rPr>
+              <a:t>  </a:t>
+            </a:r>
+            <a:r>
+              <a:rPr lang="en-US" sz="3200" dirty="0">
+                <a:solidFill>
+                  <a:schemeClr val="tx1">
+                    <a:lumMod val="50000"/>
+                    <a:lumOff val="50000"/>
+                  </a:schemeClr>
+                </a:solidFill>
+                <a:latin typeface="Consolas" panose="020B0609020204030204" pitchFamily="49" charset="0"/>
+                <a:cs typeface="Consolas" panose="020B0609020204030204" pitchFamily="49" charset="0"/>
+              </a:rPr>
+              <a:t>/* Always unlocked when `guard` goes</a:t>
+            </a:r>
+          </a:p>
+          <a:p>
+            <a:r>
+              <a:rPr lang="en-US" sz="3200" dirty="0">
+                <a:solidFill>
+                  <a:schemeClr val="tx1">
+                    <a:lumMod val="50000"/>
+                    <a:lumOff val="50000"/>
+                  </a:schemeClr>
+                </a:solidFill>
+                <a:latin typeface="Consolas" panose="020B0609020204030204" pitchFamily="49" charset="0"/>
+                <a:cs typeface="Consolas" panose="020B0609020204030204" pitchFamily="49" charset="0"/>
+              </a:rPr>
+              <a:t>   * out-of-scope</a:t>
+            </a:r>
+          </a:p>
+          <a:p>
+            <a:r>
+              <a:rPr lang="en-US" sz="3200" dirty="0">
+                <a:solidFill>
+                  <a:schemeClr val="tx1">
+                    <a:lumMod val="50000"/>
+                    <a:lumOff val="50000"/>
+                  </a:schemeClr>
+                </a:solidFill>
+                <a:latin typeface="Consolas" panose="020B0609020204030204" pitchFamily="49" charset="0"/>
+                <a:cs typeface="Consolas" panose="020B0609020204030204" pitchFamily="49" charset="0"/>
+              </a:rPr>
+              <a:t>   */</a:t>
+            </a:r>
+          </a:p>
+          <a:p>
+            <a:r>
+              <a:rPr lang="en-US" sz="3200" dirty="0">
+                <a:latin typeface="Consolas" panose="020B0609020204030204" pitchFamily="49" charset="0"/>
+                <a:cs typeface="Consolas" panose="020B0609020204030204" pitchFamily="49" charset="0"/>
+              </a:rPr>
+              <a:t>}</a:t>
+            </a:r>
+          </a:p>
+        </p:txBody>
+      </p:sp>
     </p:spTree>
     <p:extLst>
       <p:ext uri="{BB962C8B-B14F-4D97-AF65-F5344CB8AC3E}">
@@ -4901,4 +5867,299 @@
     </a:ext>
   </a:extLst>
 </a:theme>
+</file>
+
+<file path=ppt/theme/theme2.xml><?xml version="1.0" encoding="utf-8"?>
+<a:theme xmlns:a="http://schemas.openxmlformats.org/drawingml/2006/main" name="Office Theme">
+  <a:themeElements>
+    <a:clrScheme name="Office">
+      <a:dk1>
+        <a:sysClr val="windowText" lastClr="000000"/>
+      </a:dk1>
+      <a:lt1>
+        <a:sysClr val="window" lastClr="FFFFFF"/>
+      </a:lt1>
+      <a:dk2>
+        <a:srgbClr val="44546A"/>
+      </a:dk2>
+      <a:lt2>
+        <a:srgbClr val="E7E6E6"/>
+      </a:lt2>
+      <a:accent1>
+        <a:srgbClr val="4472C4"/>
+      </a:accent1>
+      <a:accent2>
+        <a:srgbClr val="ED7D31"/>
+      </a:accent2>
+      <a:accent3>
+        <a:srgbClr val="A5A5A5"/>
+      </a:accent3>
+      <a:accent4>
+        <a:srgbClr val="FFC000"/>
+      </a:accent4>
+      <a:accent5>
+        <a:srgbClr val="5B9BD5"/>
+      </a:accent5>
+      <a:accent6>
+        <a:srgbClr val="70AD47"/>
+      </a:accent6>
+      <a:hlink>
+        <a:srgbClr val="0563C1"/>
+      </a:hlink>
+      <a:folHlink>
+        <a:srgbClr val="954F72"/>
+      </a:folHlink>
+    </a:clrScheme>
+    <a:fontScheme name="Office">
+      <a:majorFont>
+        <a:latin typeface="Calibri Light" panose="020F0302020204030204"/>
+        <a:ea typeface=""/>
+        <a:cs typeface=""/>
+        <a:font script="Jpan" typeface="游ゴシック Light"/>
+        <a:font script="Hang" typeface="맑은 고딕"/>
+        <a:font script="Hans" typeface="等线 Light"/>
+        <a:font script="Hant" typeface="新細明體"/>
+        <a:font script="Arab" typeface="Times New Roman"/>
+        <a:font script="Hebr" typeface="Times New Roman"/>
+        <a:font script="Thai" typeface="Angsana New"/>
+        <a:font script="Ethi" typeface="Nyala"/>
+        <a:font script="Beng" typeface="Vrinda"/>
+        <a:font script="Gujr" typeface="Shruti"/>
+        <a:font script="Khmr" typeface="MoolBoran"/>
+        <a:font script="Knda" typeface="Tunga"/>
+        <a:font script="Guru" typeface="Raavi"/>
+        <a:font script="Cans" typeface="Euphemia"/>
+        <a:font script="Cher" typeface="Plantagenet Cherokee"/>
+        <a:font script="Yiii" typeface="Microsoft Yi Baiti"/>
+        <a:font script="Tibt" typeface="Microsoft Himalaya"/>
+        <a:font script="Thaa" typeface="MV Boli"/>
+        <a:font script="Deva" typeface="Mangal"/>
+        <a:font script="Telu" typeface="Gautami"/>
+        <a:font script="Taml" typeface="Latha"/>
+        <a:font script="Syrc" typeface="Estrangelo Edessa"/>
+        <a:font script="Orya" typeface="Kalinga"/>
+        <a:font script="Mlym" typeface="Kartika"/>
+        <a:font script="Laoo" typeface="DokChampa"/>
+        <a:font script="Sinh" typeface="Iskoola Pota"/>
+        <a:font script="Mong" typeface="Mongolian Baiti"/>
+        <a:font script="Viet" typeface="Times New Roman"/>
+        <a:font script="Uigh" typeface="Microsoft Uighur"/>
+        <a:font script="Geor" typeface="Sylfaen"/>
+        <a:font script="Armn" typeface="Arial"/>
+        <a:font script="Bugi" typeface="Leelawadee UI"/>
+        <a:font script="Bopo" typeface="Microsoft JhengHei"/>
+        <a:font script="Java" typeface="Javanese Text"/>
+        <a:font script="Lisu" typeface="Segoe UI"/>
+        <a:font script="Mymr" typeface="Myanmar Text"/>
+        <a:font script="Nkoo" typeface="Ebrima"/>
+        <a:font script="Olck" typeface="Nirmala UI"/>
+        <a:font script="Osma" typeface="Ebrima"/>
+        <a:font script="Phag" typeface="Phagspa"/>
+        <a:font script="Syrn" typeface="Estrangelo Edessa"/>
+        <a:font script="Syrj" typeface="Estrangelo Edessa"/>
+        <a:font script="Syre" typeface="Estrangelo Edessa"/>
+        <a:font script="Sora" typeface="Nirmala UI"/>
+        <a:font script="Tale" typeface="Microsoft Tai Le"/>
+        <a:font script="Talu" typeface="Microsoft New Tai Lue"/>
+        <a:font script="Tfng" typeface="Ebrima"/>
+      </a:majorFont>
+      <a:minorFont>
+        <a:latin typeface="Calibri" panose="020F0502020204030204"/>
+        <a:ea typeface=""/>
+        <a:cs typeface=""/>
+        <a:font script="Jpan" typeface="游ゴシック"/>
+        <a:font script="Hang" typeface="맑은 고딕"/>
+        <a:font script="Hans" typeface="等线"/>
+        <a:font script="Hant" typeface="新細明體"/>
+        <a:font script="Arab" typeface="Arial"/>
+        <a:font script="Hebr" typeface="Arial"/>
+        <a:font script="Thai" typeface="Cordia New"/>
+        <a:font script="Ethi" typeface="Nyala"/>
+        <a:font script="Beng" typeface="Vrinda"/>
+        <a:font script="Gujr" typeface="Shruti"/>
+        <a:font script="Khmr" typeface="DaunPenh"/>
+        <a:font script="Knda" typeface="Tunga"/>
+        <a:font script="Guru" typeface="Raavi"/>
+        <a:font script="Cans" typeface="Euphemia"/>
+        <a:font script="Cher" typeface="Plantagenet Cherokee"/>
+        <a:font script="Yiii" typeface="Microsoft Yi Baiti"/>
+        <a:font script="Tibt" typeface="Microsoft Himalaya"/>
+        <a:font script="Thaa" typeface="MV Boli"/>
+        <a:font script="Deva" typeface="Mangal"/>
+        <a:font script="Telu" typeface="Gautami"/>
+        <a:font script="Taml" typeface="Latha"/>
+        <a:font script="Syrc" typeface="Estrangelo Edessa"/>
+        <a:font script="Orya" typeface="Kalinga"/>
+        <a:font script="Mlym" typeface="Kartika"/>
+        <a:font script="Laoo" typeface="DokChampa"/>
+        <a:font script="Sinh" typeface="Iskoola Pota"/>
+        <a:font script="Mong" typeface="Mongolian Baiti"/>
+        <a:font script="Viet" typeface="Arial"/>
+        <a:font script="Uigh" typeface="Microsoft Uighur"/>
+        <a:font script="Geor" typeface="Sylfaen"/>
+        <a:font script="Armn" typeface="Arial"/>
+        <a:font script="Bugi" typeface="Leelawadee UI"/>
+        <a:font script="Bopo" typeface="Microsoft JhengHei"/>
+        <a:font script="Java" typeface="Javanese Text"/>
+        <a:font script="Lisu" typeface="Segoe UI"/>
+        <a:font script="Mymr" typeface="Myanmar Text"/>
+        <a:font script="Nkoo" typeface="Ebrima"/>
+        <a:font script="Olck" typeface="Nirmala UI"/>
+        <a:font script="Osma" typeface="Ebrima"/>
+        <a:font script="Phag" typeface="Phagspa"/>
+        <a:font script="Syrn" typeface="Estrangelo Edessa"/>
+        <a:font script="Syrj" typeface="Estrangelo Edessa"/>
+        <a:font script="Syre" typeface="Estrangelo Edessa"/>
+        <a:font script="Sora" typeface="Nirmala UI"/>
+        <a:font script="Tale" typeface="Microsoft Tai Le"/>
+        <a:font script="Talu" typeface="Microsoft New Tai Lue"/>
+        <a:font script="Tfng" typeface="Ebrima"/>
+      </a:minorFont>
+    </a:fontScheme>
+    <a:fmtScheme name="Office">
+      <a:fillStyleLst>
+        <a:solidFill>
+          <a:schemeClr val="phClr"/>
+        </a:solidFill>
+        <a:gradFill rotWithShape="1">
+          <a:gsLst>
+            <a:gs pos="0">
+              <a:schemeClr val="phClr">
+                <a:lumMod val="110000"/>
+                <a:satMod val="105000"/>
+                <a:tint val="67000"/>
+              </a:schemeClr>
+            </a:gs>
+            <a:gs pos="50000">
+              <a:schemeClr val="phClr">
+                <a:lumMod val="105000"/>
+                <a:satMod val="103000"/>
+                <a:tint val="73000"/>
+              </a:schemeClr>
+            </a:gs>
+            <a:gs pos="100000">
+              <a:schemeClr val="phClr">
+                <a:lumMod val="105000"/>
+                <a:satMod val="109000"/>
+                <a:tint val="81000"/>
+              </a:schemeClr>
+            </a:gs>
+          </a:gsLst>
+          <a:lin ang="5400000" scaled="0"/>
+        </a:gradFill>
+        <a:gradFill rotWithShape="1">
+          <a:gsLst>
+            <a:gs pos="0">
+              <a:schemeClr val="phClr">
+                <a:satMod val="103000"/>
+                <a:lumMod val="102000"/>
+                <a:tint val="94000"/>
+              </a:schemeClr>
+            </a:gs>
+            <a:gs pos="50000">
+              <a:schemeClr val="phClr">
+                <a:satMod val="110000"/>
+                <a:lumMod val="100000"/>
+                <a:shade val="100000"/>
+              </a:schemeClr>
+            </a:gs>
+            <a:gs pos="100000">
+              <a:schemeClr val="phClr">
+                <a:lumMod val="99000"/>
+                <a:satMod val="120000"/>
+                <a:shade val="78000"/>
+              </a:schemeClr>
+            </a:gs>
+          </a:gsLst>
+          <a:lin ang="5400000" scaled="0"/>
+        </a:gradFill>
+      </a:fillStyleLst>
+      <a:lnStyleLst>
+        <a:ln w="6350" cap="flat" cmpd="sng" algn="ctr">
+          <a:solidFill>
+            <a:schemeClr val="phClr"/>
+          </a:solidFill>
+          <a:prstDash val="solid"/>
+          <a:miter lim="800000"/>
+        </a:ln>
+        <a:ln w="12700" cap="flat" cmpd="sng" algn="ctr">
+          <a:solidFill>
+            <a:schemeClr val="phClr"/>
+          </a:solidFill>
+          <a:prstDash val="solid"/>
+          <a:miter lim="800000"/>
+        </a:ln>
+        <a:ln w="19050" cap="flat" cmpd="sng" algn="ctr">
+          <a:solidFill>
+            <a:schemeClr val="phClr"/>
+          </a:solidFill>
+          <a:prstDash val="solid"/>
+          <a:miter lim="800000"/>
+        </a:ln>
+      </a:lnStyleLst>
+      <a:effectStyleLst>
+        <a:effectStyle>
+          <a:effectLst/>
+        </a:effectStyle>
+        <a:effectStyle>
+          <a:effectLst/>
+        </a:effectStyle>
+        <a:effectStyle>
+          <a:effectLst>
+            <a:outerShdw blurRad="57150" dist="19050" dir="5400000" algn="ctr" rotWithShape="0">
+              <a:srgbClr val="000000">
+                <a:alpha val="63000"/>
+              </a:srgbClr>
+            </a:outerShdw>
+          </a:effectLst>
+        </a:effectStyle>
+      </a:effectStyleLst>
+      <a:bgFillStyleLst>
+        <a:solidFill>
+          <a:schemeClr val="phClr"/>
+        </a:solidFill>
+        <a:solidFill>
+          <a:schemeClr val="phClr">
+            <a:tint val="95000"/>
+            <a:satMod val="170000"/>
+          </a:schemeClr>
+        </a:solidFill>
+        <a:gradFill rotWithShape="1">
+          <a:gsLst>
+            <a:gs pos="0">
+              <a:schemeClr val="phClr">
+                <a:tint val="93000"/>
+                <a:satMod val="150000"/>
+                <a:shade val="98000"/>
+                <a:lumMod val="102000"/>
+              </a:schemeClr>
+            </a:gs>
+            <a:gs pos="50000">
+              <a:schemeClr val="phClr">
+                <a:tint val="98000"/>
+                <a:satMod val="130000"/>
+                <a:shade val="90000"/>
+                <a:lumMod val="103000"/>
+              </a:schemeClr>
+            </a:gs>
+            <a:gs pos="100000">
+              <a:schemeClr val="phClr">
+                <a:shade val="63000"/>
+                <a:satMod val="120000"/>
+              </a:schemeClr>
+            </a:gs>
+          </a:gsLst>
+          <a:lin ang="5400000" scaled="0"/>
+        </a:gradFill>
+      </a:bgFillStyleLst>
+    </a:fmtScheme>
+  </a:themeElements>
+  <a:objectDefaults/>
+  <a:extraClrSchemeLst/>
+  <a:extLst>
+    <a:ext uri="{05A4C25C-085E-4340-85A3-A5531E510DB2}">
+      <thm15:themeFamily xmlns:thm15="http://schemas.microsoft.com/office/thememl/2012/main" name="Office Theme" id="{62F939B6-93AF-4DB8-9C6B-D6C7DFDC589F}" vid="{4A3C46E8-61CC-4603-A589-7422A47A8E4A}"/>
+    </a:ext>
+  </a:extLst>
+</a:theme>
 </file>
</xml_diff>

<commit_message>
docs: revise poster yet again
Signed-off-by: Jinghao Jia <jinghao7@illinois.edu>
</commit_message>
<xml_diff>
--- a/docs/poster.pptx
+++ b/docs/poster.pptx
@@ -3418,7 +3418,7 @@
         </p:nvSpPr>
         <p:spPr>
           <a:xfrm>
-            <a:off x="12731263" y="1889987"/>
+            <a:off x="13590244" y="1936465"/>
             <a:ext cx="16605736" cy="1754326"/>
           </a:xfrm>
           <a:prstGeom prst="rect">
@@ -3730,7 +3730,7 @@
         <p:spPr>
           <a:xfrm>
             <a:off x="1064779" y="5213876"/>
-            <a:ext cx="9842710" cy="4401205"/>
+            <a:ext cx="9842710" cy="2554545"/>
           </a:xfrm>
           <a:prstGeom prst="rect">
             <a:avLst/>
@@ -3752,33 +3752,6 @@
                 <a:latin typeface="Arial" panose="020B0604020202020204" pitchFamily="34" charset="0"/>
                 <a:cs typeface="Arial" panose="020B0604020202020204" pitchFamily="34" charset="0"/>
               </a:rPr>
-              <a:t>The emergence of verified </a:t>
-            </a:r>
-            <a:r>
-              <a:rPr lang="en-US" sz="4000" dirty="0" err="1">
-                <a:latin typeface="Arial" panose="020B0604020202020204" pitchFamily="34" charset="0"/>
-                <a:cs typeface="Arial" panose="020B0604020202020204" pitchFamily="34" charset="0"/>
-              </a:rPr>
-              <a:t>eBPF</a:t>
-            </a:r>
-            <a:r>
-              <a:rPr lang="en-US" sz="4000" dirty="0">
-                <a:latin typeface="Arial" panose="020B0604020202020204" pitchFamily="34" charset="0"/>
-                <a:cs typeface="Arial" panose="020B0604020202020204" pitchFamily="34" charset="0"/>
-              </a:rPr>
-              <a:t> bytecode ushers in a new era of safe kernel extensions.</a:t>
-            </a:r>
-          </a:p>
-          <a:p>
-            <a:pPr marL="571500" indent="-571500">
-              <a:buFont typeface="Arial" panose="020B0604020202020204" pitchFamily="34" charset="0"/>
-              <a:buChar char="•"/>
-            </a:pPr>
-            <a:r>
-              <a:rPr lang="en-US" sz="4000" dirty="0">
-                <a:latin typeface="Arial" panose="020B0604020202020204" pitchFamily="34" charset="0"/>
-                <a:cs typeface="Arial" panose="020B0604020202020204" pitchFamily="34" charset="0"/>
-              </a:rPr>
               <a:t>The </a:t>
             </a:r>
             <a:r>
@@ -3841,36 +3814,6 @@
           </a:p>
         </p:txBody>
       </p:sp>
-      <p:pic>
-        <p:nvPicPr>
-          <p:cNvPr id="16" name="Picture 15">
-            <a:extLst>
-              <a:ext uri="{FF2B5EF4-FFF2-40B4-BE49-F238E27FC236}">
-                <a16:creationId xmlns:a16="http://schemas.microsoft.com/office/drawing/2014/main" id="{38492B1A-878B-CB8E-1B44-404AA0C2AFD1}"/>
-              </a:ext>
-            </a:extLst>
-          </p:cNvPr>
-          <p:cNvPicPr>
-            <a:picLocks noChangeAspect="1"/>
-          </p:cNvPicPr>
-          <p:nvPr/>
-        </p:nvPicPr>
-        <p:blipFill>
-          <a:blip r:embed="rId2"/>
-          <a:stretch>
-            <a:fillRect/>
-          </a:stretch>
-        </p:blipFill>
-        <p:spPr>
-          <a:xfrm>
-            <a:off x="1064779" y="9711690"/>
-            <a:ext cx="9842710" cy="5736289"/>
-          </a:xfrm>
-          <a:prstGeom prst="rect">
-            <a:avLst/>
-          </a:prstGeom>
-        </p:spPr>
-      </p:pic>
       <p:grpSp>
         <p:nvGrpSpPr>
           <p:cNvPr id="17" name="Group 16">
@@ -4376,7 +4319,7 @@
           <p:nvPr/>
         </p:nvPicPr>
         <p:blipFill>
-          <a:blip r:embed="rId3"/>
+          <a:blip r:embed="rId2"/>
           <a:stretch>
             <a:fillRect/>
           </a:stretch>
@@ -4589,10 +4532,10 @@
           <p:nvPr/>
         </p:nvPicPr>
         <p:blipFill rotWithShape="1">
-          <a:blip r:embed="rId4">
+          <a:blip r:embed="rId3">
             <a:extLst>
               <a:ext uri="{96DAC541-7B7A-43D3-8B79-37D633B846F1}">
-                <asvg:svgBlip xmlns:asvg="http://schemas.microsoft.com/office/drawing/2016/SVG/main" r:embed="rId5"/>
+                <asvg:svgBlip xmlns:asvg="http://schemas.microsoft.com/office/drawing/2016/SVG/main" r:embed="rId4"/>
               </a:ext>
             </a:extLst>
           </a:blip>
@@ -4601,7 +4544,7 @@
         </p:blipFill>
         <p:spPr>
           <a:xfrm>
-            <a:off x="8862951" y="1929532"/>
+            <a:off x="9721932" y="1976010"/>
             <a:ext cx="3654527" cy="1424476"/>
           </a:xfrm>
           <a:prstGeom prst="rect">
@@ -4624,7 +4567,7 @@
           <p:nvPr/>
         </p:nvPicPr>
         <p:blipFill>
-          <a:blip r:embed="rId6">
+          <a:blip r:embed="rId5">
             <a:extLst>
               <a:ext uri="{28A0092B-C50C-407E-A947-70E740481C1C}">
                 <a14:useLocalDpi xmlns:a14="http://schemas.microsoft.com/office/drawing/2010/main" val="0"/>
@@ -4638,7 +4581,7 @@
         </p:blipFill>
         <p:spPr bwMode="auto">
           <a:xfrm>
-            <a:off x="4853425" y="1719901"/>
+            <a:off x="5712406" y="1766379"/>
             <a:ext cx="4388660" cy="1813179"/>
           </a:xfrm>
           <a:prstGeom prst="rect">
@@ -4671,7 +4614,7 @@
           <p:nvPr/>
         </p:nvPicPr>
         <p:blipFill rotWithShape="1">
-          <a:blip r:embed="rId7">
+          <a:blip r:embed="rId6">
             <a:extLst>
               <a:ext uri="{28A0092B-C50C-407E-A947-70E740481C1C}">
                 <a14:useLocalDpi xmlns:a14="http://schemas.microsoft.com/office/drawing/2010/main" val="0"/>
@@ -4683,7 +4626,7 @@
         </p:blipFill>
         <p:spPr bwMode="auto">
           <a:xfrm>
-            <a:off x="1574617" y="1979072"/>
+            <a:off x="2433598" y="2025550"/>
             <a:ext cx="3065023" cy="1424477"/>
           </a:xfrm>
           <a:prstGeom prst="rect">
@@ -4699,66 +4642,6 @@
               </a14:hiddenFill>
             </a:ext>
           </a:extLst>
-        </p:spPr>
-      </p:pic>
-      <p:pic>
-        <p:nvPicPr>
-          <p:cNvPr id="9" name="Picture 8">
-            <a:extLst>
-              <a:ext uri="{FF2B5EF4-FFF2-40B4-BE49-F238E27FC236}">
-                <a16:creationId xmlns:a16="http://schemas.microsoft.com/office/drawing/2014/main" id="{A1035F9B-8BBF-E8E6-24BF-86105B721AA0}"/>
-              </a:ext>
-            </a:extLst>
-          </p:cNvPr>
-          <p:cNvPicPr>
-            <a:picLocks noChangeAspect="1"/>
-          </p:cNvPicPr>
-          <p:nvPr/>
-        </p:nvPicPr>
-        <p:blipFill>
-          <a:blip r:embed="rId8"/>
-          <a:stretch>
-            <a:fillRect/>
-          </a:stretch>
-        </p:blipFill>
-        <p:spPr>
-          <a:xfrm>
-            <a:off x="1064779" y="15209823"/>
-            <a:ext cx="5094868" cy="3056921"/>
-          </a:xfrm>
-          <a:prstGeom prst="rect">
-            <a:avLst/>
-          </a:prstGeom>
-        </p:spPr>
-      </p:pic>
-      <p:pic>
-        <p:nvPicPr>
-          <p:cNvPr id="25" name="Picture 24">
-            <a:extLst>
-              <a:ext uri="{FF2B5EF4-FFF2-40B4-BE49-F238E27FC236}">
-                <a16:creationId xmlns:a16="http://schemas.microsoft.com/office/drawing/2014/main" id="{F10F56D5-C0E8-5341-692B-39053814DDE5}"/>
-              </a:ext>
-            </a:extLst>
-          </p:cNvPr>
-          <p:cNvPicPr>
-            <a:picLocks noChangeAspect="1"/>
-          </p:cNvPicPr>
-          <p:nvPr/>
-        </p:nvPicPr>
-        <p:blipFill>
-          <a:blip r:embed="rId9"/>
-          <a:stretch>
-            <a:fillRect/>
-          </a:stretch>
-        </p:blipFill>
-        <p:spPr>
-          <a:xfrm>
-            <a:off x="5986134" y="15209823"/>
-            <a:ext cx="5094868" cy="3056921"/>
-          </a:xfrm>
-          <a:prstGeom prst="rect">
-            <a:avLst/>
-          </a:prstGeom>
         </p:spPr>
       </p:pic>
       <p:pic>
@@ -4776,14 +4659,14 @@
           <p:nvPr/>
         </p:nvPicPr>
         <p:blipFill>
-          <a:blip r:embed="rId10"/>
+          <a:blip r:embed="rId7"/>
           <a:stretch>
             <a:fillRect/>
           </a:stretch>
         </p:blipFill>
         <p:spPr>
           <a:xfrm>
-            <a:off x="1064779" y="18131750"/>
+            <a:off x="1064779" y="18293593"/>
             <a:ext cx="9842710" cy="3444949"/>
           </a:xfrm>
           <a:prstGeom prst="rect">
@@ -4806,12 +4689,21 @@
         <p:spPr>
           <a:xfrm>
             <a:off x="22010910" y="7347100"/>
-            <a:ext cx="9842709" cy="5509200"/>
+            <a:ext cx="9842709" cy="5170646"/>
           </a:xfrm>
           <a:prstGeom prst="rect">
             <a:avLst/>
           </a:prstGeom>
-          <a:noFill/>
+          <a:solidFill>
+            <a:srgbClr val="FCF6E5"/>
+          </a:solidFill>
+          <a:ln>
+            <a:solidFill>
+              <a:schemeClr val="accent1">
+                <a:shade val="50000"/>
+              </a:schemeClr>
+            </a:solidFill>
+          </a:ln>
         </p:spPr>
         <p:txBody>
           <a:bodyPr wrap="square" rtlCol="0">
@@ -4820,311 +4712,369 @@
           <a:lstStyle/>
           <a:p>
             <a:r>
-              <a:rPr lang="en-US" sz="3200" dirty="0">
-                <a:latin typeface="Consolas" panose="020B0609020204030204" pitchFamily="49" charset="0"/>
-                <a:cs typeface="Consolas" panose="020B0609020204030204" pitchFamily="49" charset="0"/>
-              </a:rPr>
-              <a:t>int </a:t>
-            </a:r>
-            <a:r>
-              <a:rPr lang="en-US" sz="3200" dirty="0">
-                <a:solidFill>
-                  <a:srgbClr val="0070C0"/>
-                </a:solidFill>
-                <a:latin typeface="Consolas" panose="020B0609020204030204" pitchFamily="49" charset="0"/>
-                <a:cs typeface="Consolas" panose="020B0609020204030204" pitchFamily="49" charset="0"/>
+              <a:rPr lang="en-US" sz="3000" b="1" dirty="0">
+                <a:solidFill>
+                  <a:srgbClr val="586E75"/>
+                </a:solidFill>
+                <a:effectLst/>
+                <a:latin typeface="Menlo" panose="020B0609030804020204" pitchFamily="49" charset="0"/>
+              </a:rPr>
+              <a:t>int</a:t>
+            </a:r>
+            <a:r>
+              <a:rPr lang="en-US" sz="3000" b="0" dirty="0">
+                <a:solidFill>
+                  <a:srgbClr val="657B83"/>
+                </a:solidFill>
+                <a:effectLst/>
+                <a:latin typeface="Menlo" panose="020B0609030804020204" pitchFamily="49" charset="0"/>
+              </a:rPr>
+              <a:t> </a:t>
+            </a:r>
+            <a:r>
+              <a:rPr lang="en-US" sz="3000" b="0" dirty="0">
+                <a:solidFill>
+                  <a:srgbClr val="268BD2"/>
+                </a:solidFill>
+                <a:effectLst/>
+                <a:latin typeface="Menlo" panose="020B0609030804020204" pitchFamily="49" charset="0"/>
               </a:rPr>
               <a:t>bpf_prog1</a:t>
             </a:r>
             <a:r>
-              <a:rPr lang="en-US" sz="3200" dirty="0">
-                <a:latin typeface="Consolas" panose="020B0609020204030204" pitchFamily="49" charset="0"/>
-                <a:cs typeface="Consolas" panose="020B0609020204030204" pitchFamily="49" charset="0"/>
-              </a:rPr>
-              <a:t>(void </a:t>
-            </a:r>
-            <a:r>
-              <a:rPr lang="en-US" sz="3200" dirty="0">
-                <a:solidFill>
-                  <a:srgbClr val="0070C0"/>
-                </a:solidFill>
-                <a:latin typeface="Consolas" panose="020B0609020204030204" pitchFamily="49" charset="0"/>
-                <a:cs typeface="Consolas" panose="020B0609020204030204" pitchFamily="49" charset="0"/>
+              <a:rPr lang="en-US" sz="3000" b="0" dirty="0">
+                <a:solidFill>
+                  <a:srgbClr val="657B83"/>
+                </a:solidFill>
+                <a:effectLst/>
+                <a:latin typeface="Menlo" panose="020B0609030804020204" pitchFamily="49" charset="0"/>
+              </a:rPr>
+              <a:t>(</a:t>
+            </a:r>
+            <a:r>
+              <a:rPr lang="en-US" sz="3000" b="1" dirty="0">
+                <a:solidFill>
+                  <a:srgbClr val="586E75"/>
+                </a:solidFill>
+                <a:effectLst/>
+                <a:latin typeface="Menlo" panose="020B0609030804020204" pitchFamily="49" charset="0"/>
+              </a:rPr>
+              <a:t>void</a:t>
+            </a:r>
+            <a:r>
+              <a:rPr lang="en-US" sz="3000" b="0" dirty="0">
+                <a:solidFill>
+                  <a:srgbClr val="657B83"/>
+                </a:solidFill>
+                <a:effectLst/>
+                <a:latin typeface="Menlo" panose="020B0609030804020204" pitchFamily="49" charset="0"/>
+              </a:rPr>
+              <a:t> </a:t>
+            </a:r>
+            <a:r>
+              <a:rPr lang="en-US" sz="3000" b="0" dirty="0">
+                <a:solidFill>
+                  <a:srgbClr val="859900"/>
+                </a:solidFill>
+                <a:effectLst/>
+                <a:latin typeface="Menlo" panose="020B0609030804020204" pitchFamily="49" charset="0"/>
               </a:rPr>
               <a:t>*</a:t>
             </a:r>
             <a:r>
-              <a:rPr lang="en-US" sz="3200" dirty="0" err="1">
-                <a:latin typeface="Consolas" panose="020B0609020204030204" pitchFamily="49" charset="0"/>
-                <a:cs typeface="Consolas" panose="020B0609020204030204" pitchFamily="49" charset="0"/>
+              <a:rPr lang="en-US" sz="3000" b="0" dirty="0" err="1">
+                <a:solidFill>
+                  <a:srgbClr val="657B83"/>
+                </a:solidFill>
+                <a:effectLst/>
+                <a:latin typeface="Menlo" panose="020B0609030804020204" pitchFamily="49" charset="0"/>
               </a:rPr>
               <a:t>ctx</a:t>
             </a:r>
             <a:r>
-              <a:rPr lang="en-US" sz="3200" dirty="0">
-                <a:latin typeface="Consolas" panose="020B0609020204030204" pitchFamily="49" charset="0"/>
-                <a:cs typeface="Consolas" panose="020B0609020204030204" pitchFamily="49" charset="0"/>
+              <a:rPr lang="en-US" sz="3000" b="0" dirty="0">
+                <a:solidFill>
+                  <a:srgbClr val="657B83"/>
+                </a:solidFill>
+                <a:effectLst/>
+                <a:latin typeface="Menlo" panose="020B0609030804020204" pitchFamily="49" charset="0"/>
               </a:rPr>
               <a:t>)</a:t>
             </a:r>
           </a:p>
           <a:p>
             <a:r>
-              <a:rPr lang="en-US" sz="3200" dirty="0">
-                <a:latin typeface="Consolas" panose="020B0609020204030204" pitchFamily="49" charset="0"/>
-                <a:cs typeface="Consolas" panose="020B0609020204030204" pitchFamily="49" charset="0"/>
+              <a:rPr lang="en-US" sz="3000" b="0" dirty="0">
+                <a:solidFill>
+                  <a:srgbClr val="657B83"/>
+                </a:solidFill>
+                <a:effectLst/>
+                <a:latin typeface="Menlo" panose="020B0609030804020204" pitchFamily="49" charset="0"/>
               </a:rPr>
               <a:t>{</a:t>
             </a:r>
           </a:p>
           <a:p>
             <a:r>
-              <a:rPr lang="en-US" sz="3200" dirty="0">
-                <a:latin typeface="Consolas" panose="020B0609020204030204" pitchFamily="49" charset="0"/>
-                <a:cs typeface="Consolas" panose="020B0609020204030204" pitchFamily="49" charset="0"/>
+              <a:rPr lang="en-US" sz="3000" b="0" dirty="0">
+                <a:solidFill>
+                  <a:srgbClr val="268BD2"/>
+                </a:solidFill>
+                <a:effectLst/>
+                <a:latin typeface="Menlo" panose="020B0609030804020204" pitchFamily="49" charset="0"/>
               </a:rPr>
               <a:t>  </a:t>
             </a:r>
             <a:r>
-              <a:rPr lang="en-US" sz="3200" dirty="0" err="1">
-                <a:solidFill>
-                  <a:srgbClr val="0070C0"/>
-                </a:solidFill>
-                <a:latin typeface="Consolas" panose="020B0609020204030204" pitchFamily="49" charset="0"/>
-                <a:cs typeface="Consolas" panose="020B0609020204030204" pitchFamily="49" charset="0"/>
+              <a:rPr lang="en-US" sz="3000" b="0" dirty="0" err="1">
+                <a:solidFill>
+                  <a:srgbClr val="268BD2"/>
+                </a:solidFill>
+                <a:effectLst/>
+                <a:latin typeface="Menlo" panose="020B0609030804020204" pitchFamily="49" charset="0"/>
               </a:rPr>
               <a:t>bpf_spin_lock</a:t>
             </a:r>
             <a:r>
-              <a:rPr lang="en-US" sz="3200" dirty="0">
-                <a:latin typeface="Consolas" panose="020B0609020204030204" pitchFamily="49" charset="0"/>
-                <a:cs typeface="Consolas" panose="020B0609020204030204" pitchFamily="49" charset="0"/>
+              <a:rPr lang="en-US" sz="3000" b="0" dirty="0">
+                <a:solidFill>
+                  <a:srgbClr val="657B83"/>
+                </a:solidFill>
+                <a:effectLst/>
+                <a:latin typeface="Menlo" panose="020B0609030804020204" pitchFamily="49" charset="0"/>
               </a:rPr>
               <a:t>(l);</a:t>
             </a:r>
           </a:p>
           <a:p>
             <a:r>
-              <a:rPr lang="en-US" sz="3200" dirty="0">
-                <a:latin typeface="Consolas" panose="020B0609020204030204" pitchFamily="49" charset="0"/>
-                <a:cs typeface="Consolas" panose="020B0609020204030204" pitchFamily="49" charset="0"/>
-              </a:rPr>
-              <a:t>  </a:t>
-            </a:r>
-            <a:r>
-              <a:rPr lang="en-US" sz="3200" dirty="0">
-                <a:solidFill>
-                  <a:schemeClr val="accent2">
-                    <a:lumMod val="50000"/>
-                  </a:schemeClr>
-                </a:solidFill>
-                <a:latin typeface="Consolas" panose="020B0609020204030204" pitchFamily="49" charset="0"/>
-                <a:cs typeface="Consolas" panose="020B0609020204030204" pitchFamily="49" charset="0"/>
-              </a:rPr>
-              <a:t>if</a:t>
-            </a:r>
-            <a:r>
-              <a:rPr lang="en-US" sz="3200" dirty="0">
-                <a:latin typeface="Consolas" panose="020B0609020204030204" pitchFamily="49" charset="0"/>
-                <a:cs typeface="Consolas" panose="020B0609020204030204" pitchFamily="49" charset="0"/>
+              <a:rPr lang="en-US" sz="3000" b="0" dirty="0">
+                <a:solidFill>
+                  <a:srgbClr val="859900"/>
+                </a:solidFill>
+                <a:effectLst/>
+                <a:latin typeface="Menlo" panose="020B0609030804020204" pitchFamily="49" charset="0"/>
+              </a:rPr>
+              <a:t>  if</a:t>
+            </a:r>
+            <a:r>
+              <a:rPr lang="en-US" sz="3000" b="0" dirty="0">
+                <a:solidFill>
+                  <a:srgbClr val="657B83"/>
+                </a:solidFill>
+                <a:effectLst/>
+                <a:latin typeface="Menlo" panose="020B0609030804020204" pitchFamily="49" charset="0"/>
               </a:rPr>
               <a:t> (</a:t>
             </a:r>
             <a:r>
-              <a:rPr lang="en-US" sz="3200" dirty="0" err="1">
-                <a:latin typeface="Consolas" panose="020B0609020204030204" pitchFamily="49" charset="0"/>
-                <a:cs typeface="Consolas" panose="020B0609020204030204" pitchFamily="49" charset="0"/>
+              <a:rPr lang="en-US" sz="3000" b="0" dirty="0" err="1">
+                <a:solidFill>
+                  <a:srgbClr val="657B83"/>
+                </a:solidFill>
+                <a:effectLst/>
+                <a:latin typeface="Menlo" panose="020B0609030804020204" pitchFamily="49" charset="0"/>
               </a:rPr>
               <a:t>some_cond</a:t>
             </a:r>
             <a:r>
-              <a:rPr lang="en-US" sz="3200" dirty="0">
-                <a:latin typeface="Consolas" panose="020B0609020204030204" pitchFamily="49" charset="0"/>
-                <a:cs typeface="Consolas" panose="020B0609020204030204" pitchFamily="49" charset="0"/>
+              <a:rPr lang="en-US" sz="3000" b="0" dirty="0">
+                <a:solidFill>
+                  <a:srgbClr val="657B83"/>
+                </a:solidFill>
+                <a:effectLst/>
+                <a:latin typeface="Menlo" panose="020B0609030804020204" pitchFamily="49" charset="0"/>
               </a:rPr>
               <a:t>) {</a:t>
             </a:r>
           </a:p>
           <a:p>
             <a:r>
-              <a:rPr lang="en-US" sz="3200" dirty="0">
-                <a:latin typeface="Consolas" panose="020B0609020204030204" pitchFamily="49" charset="0"/>
-                <a:cs typeface="Consolas" panose="020B0609020204030204" pitchFamily="49" charset="0"/>
+              <a:rPr lang="en-US" sz="3000" b="0" dirty="0">
+                <a:solidFill>
+                  <a:srgbClr val="268BD2"/>
+                </a:solidFill>
+                <a:effectLst/>
+                <a:latin typeface="Menlo" panose="020B0609030804020204" pitchFamily="49" charset="0"/>
               </a:rPr>
               <a:t>    </a:t>
             </a:r>
             <a:r>
-              <a:rPr lang="en-US" sz="3200" dirty="0" err="1">
-                <a:solidFill>
-                  <a:srgbClr val="0070C0"/>
-                </a:solidFill>
-                <a:latin typeface="Consolas" panose="020B0609020204030204" pitchFamily="49" charset="0"/>
-                <a:cs typeface="Consolas" panose="020B0609020204030204" pitchFamily="49" charset="0"/>
+              <a:rPr lang="en-US" sz="3000" b="0" dirty="0" err="1">
+                <a:solidFill>
+                  <a:srgbClr val="268BD2"/>
+                </a:solidFill>
+                <a:effectLst/>
+                <a:latin typeface="Menlo" panose="020B0609030804020204" pitchFamily="49" charset="0"/>
               </a:rPr>
               <a:t>bpf_spin_unlock</a:t>
             </a:r>
             <a:r>
-              <a:rPr lang="en-US" sz="3200" dirty="0">
-                <a:latin typeface="Consolas" panose="020B0609020204030204" pitchFamily="49" charset="0"/>
-                <a:cs typeface="Consolas" panose="020B0609020204030204" pitchFamily="49" charset="0"/>
+              <a:rPr lang="en-US" sz="3000" b="0" dirty="0">
+                <a:solidFill>
+                  <a:srgbClr val="657B83"/>
+                </a:solidFill>
+                <a:effectLst/>
+                <a:latin typeface="Menlo" panose="020B0609030804020204" pitchFamily="49" charset="0"/>
               </a:rPr>
               <a:t>();</a:t>
             </a:r>
           </a:p>
           <a:p>
             <a:r>
-              <a:rPr lang="en-US" sz="3200" dirty="0">
-                <a:latin typeface="Consolas" panose="020B0609020204030204" pitchFamily="49" charset="0"/>
-                <a:cs typeface="Consolas" panose="020B0609020204030204" pitchFamily="49" charset="0"/>
-              </a:rPr>
-              <a:t>    </a:t>
-            </a:r>
-            <a:r>
-              <a:rPr lang="en-US" sz="3200" dirty="0">
-                <a:solidFill>
-                  <a:schemeClr val="accent2">
-                    <a:lumMod val="50000"/>
-                  </a:schemeClr>
-                </a:solidFill>
-                <a:latin typeface="Consolas" panose="020B0609020204030204" pitchFamily="49" charset="0"/>
-                <a:cs typeface="Consolas" panose="020B0609020204030204" pitchFamily="49" charset="0"/>
-              </a:rPr>
-              <a:t>return</a:t>
-            </a:r>
-            <a:r>
-              <a:rPr lang="en-US" sz="3200" dirty="0">
-                <a:latin typeface="Consolas" panose="020B0609020204030204" pitchFamily="49" charset="0"/>
-                <a:cs typeface="Consolas" panose="020B0609020204030204" pitchFamily="49" charset="0"/>
+              <a:rPr lang="en-US" sz="3000" b="0" dirty="0">
+                <a:solidFill>
+                  <a:srgbClr val="859900"/>
+                </a:solidFill>
+                <a:effectLst/>
+                <a:latin typeface="Menlo" panose="020B0609030804020204" pitchFamily="49" charset="0"/>
+              </a:rPr>
+              <a:t>    return</a:t>
+            </a:r>
+            <a:r>
+              <a:rPr lang="en-US" sz="3000" b="0" dirty="0">
+                <a:solidFill>
+                  <a:srgbClr val="657B83"/>
+                </a:solidFill>
+                <a:effectLst/>
+                <a:latin typeface="Menlo" panose="020B0609030804020204" pitchFamily="49" charset="0"/>
               </a:rPr>
               <a:t> </a:t>
             </a:r>
             <a:r>
-              <a:rPr lang="en-US" sz="3200" dirty="0">
-                <a:solidFill>
-                  <a:srgbClr val="0070C0"/>
-                </a:solidFill>
-                <a:latin typeface="Consolas" panose="020B0609020204030204" pitchFamily="49" charset="0"/>
-                <a:cs typeface="Consolas" panose="020B0609020204030204" pitchFamily="49" charset="0"/>
+              <a:rPr lang="en-US" sz="3000" b="0" dirty="0">
+                <a:solidFill>
+                  <a:srgbClr val="D33682"/>
+                </a:solidFill>
+                <a:effectLst/>
+                <a:latin typeface="Menlo" panose="020B0609030804020204" pitchFamily="49" charset="0"/>
               </a:rPr>
               <a:t>0</a:t>
             </a:r>
             <a:r>
-              <a:rPr lang="en-US" sz="3200" dirty="0">
-                <a:latin typeface="Consolas" panose="020B0609020204030204" pitchFamily="49" charset="0"/>
-                <a:cs typeface="Consolas" panose="020B0609020204030204" pitchFamily="49" charset="0"/>
+              <a:rPr lang="en-US" sz="3000" b="0" dirty="0">
+                <a:solidFill>
+                  <a:srgbClr val="657B83"/>
+                </a:solidFill>
+                <a:effectLst/>
+                <a:latin typeface="Menlo" panose="020B0609030804020204" pitchFamily="49" charset="0"/>
               </a:rPr>
               <a:t>;</a:t>
             </a:r>
           </a:p>
           <a:p>
             <a:r>
-              <a:rPr lang="en-US" sz="3200" dirty="0">
-                <a:latin typeface="Consolas" panose="020B0609020204030204" pitchFamily="49" charset="0"/>
-                <a:cs typeface="Consolas" panose="020B0609020204030204" pitchFamily="49" charset="0"/>
+              <a:rPr lang="en-US" sz="3000" b="0" dirty="0">
+                <a:solidFill>
+                  <a:srgbClr val="657B83"/>
+                </a:solidFill>
+                <a:effectLst/>
+                <a:latin typeface="Menlo" panose="020B0609030804020204" pitchFamily="49" charset="0"/>
               </a:rPr>
               <a:t>  } </a:t>
             </a:r>
             <a:r>
-              <a:rPr lang="en-US" sz="3200" dirty="0">
-                <a:solidFill>
-                  <a:schemeClr val="accent2">
-                    <a:lumMod val="50000"/>
-                  </a:schemeClr>
-                </a:solidFill>
-                <a:latin typeface="Consolas" panose="020B0609020204030204" pitchFamily="49" charset="0"/>
-                <a:cs typeface="Consolas" panose="020B0609020204030204" pitchFamily="49" charset="0"/>
+              <a:rPr lang="en-US" sz="3000" b="0" dirty="0">
+                <a:solidFill>
+                  <a:srgbClr val="859900"/>
+                </a:solidFill>
+                <a:effectLst/>
+                <a:latin typeface="Menlo" panose="020B0609030804020204" pitchFamily="49" charset="0"/>
               </a:rPr>
               <a:t>else</a:t>
             </a:r>
             <a:r>
-              <a:rPr lang="en-US" sz="3200" dirty="0">
-                <a:latin typeface="Consolas" panose="020B0609020204030204" pitchFamily="49" charset="0"/>
-                <a:cs typeface="Consolas" panose="020B0609020204030204" pitchFamily="49" charset="0"/>
+              <a:rPr lang="en-US" sz="3000" b="0" dirty="0">
+                <a:solidFill>
+                  <a:srgbClr val="657B83"/>
+                </a:solidFill>
+                <a:effectLst/>
+                <a:latin typeface="Menlo" panose="020B0609030804020204" pitchFamily="49" charset="0"/>
               </a:rPr>
               <a:t> {</a:t>
             </a:r>
           </a:p>
           <a:p>
             <a:r>
-              <a:rPr lang="en-US" sz="3200" dirty="0">
-                <a:latin typeface="Consolas" panose="020B0609020204030204" pitchFamily="49" charset="0"/>
-                <a:cs typeface="Consolas" panose="020B0609020204030204" pitchFamily="49" charset="0"/>
-              </a:rPr>
-              <a:t>    </a:t>
-            </a:r>
-            <a:r>
-              <a:rPr lang="en-US" sz="3200" dirty="0">
-                <a:solidFill>
-                  <a:schemeClr val="tx1">
-                    <a:lumMod val="50000"/>
-                    <a:lumOff val="50000"/>
-                  </a:schemeClr>
-                </a:solidFill>
-                <a:latin typeface="Consolas" panose="020B0609020204030204" pitchFamily="49" charset="0"/>
-                <a:cs typeface="Consolas" panose="020B0609020204030204" pitchFamily="49" charset="0"/>
-              </a:rPr>
-              <a:t>/* Not unlocked, rejected */</a:t>
-            </a:r>
-          </a:p>
-          <a:p>
-            <a:r>
-              <a:rPr lang="en-US" sz="3200" dirty="0">
-                <a:latin typeface="Consolas" panose="020B0609020204030204" pitchFamily="49" charset="0"/>
-                <a:cs typeface="Consolas" panose="020B0609020204030204" pitchFamily="49" charset="0"/>
-              </a:rPr>
-              <a:t>    </a:t>
-            </a:r>
-            <a:r>
-              <a:rPr lang="en-US" sz="3200" dirty="0">
-                <a:solidFill>
-                  <a:schemeClr val="accent2">
-                    <a:lumMod val="50000"/>
-                  </a:schemeClr>
-                </a:solidFill>
-                <a:latin typeface="Consolas" panose="020B0609020204030204" pitchFamily="49" charset="0"/>
-                <a:cs typeface="Consolas" panose="020B0609020204030204" pitchFamily="49" charset="0"/>
-              </a:rPr>
-              <a:t>return</a:t>
-            </a:r>
-            <a:r>
-              <a:rPr lang="en-US" sz="3200" dirty="0">
-                <a:latin typeface="Consolas" panose="020B0609020204030204" pitchFamily="49" charset="0"/>
-                <a:cs typeface="Consolas" panose="020B0609020204030204" pitchFamily="49" charset="0"/>
+              <a:rPr lang="en-US" sz="3000" b="0" i="1" dirty="0">
+                <a:solidFill>
+                  <a:srgbClr val="93A1A1"/>
+                </a:solidFill>
+                <a:effectLst/>
+                <a:latin typeface="Menlo" panose="020B0609030804020204" pitchFamily="49" charset="0"/>
+              </a:rPr>
+              <a:t>    /* Not unlocked, rejected */</a:t>
+            </a:r>
+            <a:endParaRPr lang="en-US" sz="3000" b="0" dirty="0">
+              <a:solidFill>
+                <a:srgbClr val="657B83"/>
+              </a:solidFill>
+              <a:effectLst/>
+              <a:latin typeface="Menlo" panose="020B0609030804020204" pitchFamily="49" charset="0"/>
+            </a:endParaRPr>
+          </a:p>
+          <a:p>
+            <a:r>
+              <a:rPr lang="en-US" sz="3000" b="0" dirty="0">
+                <a:solidFill>
+                  <a:srgbClr val="859900"/>
+                </a:solidFill>
+                <a:effectLst/>
+                <a:latin typeface="Menlo" panose="020B0609030804020204" pitchFamily="49" charset="0"/>
+              </a:rPr>
+              <a:t>    return</a:t>
+            </a:r>
+            <a:r>
+              <a:rPr lang="en-US" sz="3000" b="0" dirty="0">
+                <a:solidFill>
+                  <a:srgbClr val="657B83"/>
+                </a:solidFill>
+                <a:effectLst/>
+                <a:latin typeface="Menlo" panose="020B0609030804020204" pitchFamily="49" charset="0"/>
               </a:rPr>
               <a:t> </a:t>
             </a:r>
             <a:r>
-              <a:rPr lang="en-US" sz="3200" dirty="0">
-                <a:solidFill>
-                  <a:srgbClr val="0070C0"/>
-                </a:solidFill>
-                <a:latin typeface="Consolas" panose="020B0609020204030204" pitchFamily="49" charset="0"/>
-                <a:cs typeface="Consolas" panose="020B0609020204030204" pitchFamily="49" charset="0"/>
+              <a:rPr lang="en-US" sz="3000" b="0" dirty="0">
+                <a:solidFill>
+                  <a:srgbClr val="D33682"/>
+                </a:solidFill>
+                <a:effectLst/>
+                <a:latin typeface="Menlo" panose="020B0609030804020204" pitchFamily="49" charset="0"/>
               </a:rPr>
               <a:t>1</a:t>
             </a:r>
             <a:r>
-              <a:rPr lang="en-US" sz="3200" dirty="0">
-                <a:latin typeface="Consolas" panose="020B0609020204030204" pitchFamily="49" charset="0"/>
-                <a:cs typeface="Consolas" panose="020B0609020204030204" pitchFamily="49" charset="0"/>
+              <a:rPr lang="en-US" sz="3000" b="0" dirty="0">
+                <a:solidFill>
+                  <a:srgbClr val="657B83"/>
+                </a:solidFill>
+                <a:effectLst/>
+                <a:latin typeface="Menlo" panose="020B0609030804020204" pitchFamily="49" charset="0"/>
               </a:rPr>
               <a:t>;</a:t>
             </a:r>
           </a:p>
           <a:p>
             <a:r>
-              <a:rPr lang="en-US" sz="3200" dirty="0">
-                <a:latin typeface="Consolas" panose="020B0609020204030204" pitchFamily="49" charset="0"/>
-                <a:cs typeface="Consolas" panose="020B0609020204030204" pitchFamily="49" charset="0"/>
+              <a:rPr lang="en-US" sz="3000" b="0" dirty="0">
+                <a:solidFill>
+                  <a:srgbClr val="657B83"/>
+                </a:solidFill>
+                <a:effectLst/>
+                <a:latin typeface="Menlo" panose="020B0609030804020204" pitchFamily="49" charset="0"/>
               </a:rPr>
               <a:t>  }</a:t>
             </a:r>
           </a:p>
           <a:p>
             <a:r>
-              <a:rPr lang="en-US" sz="3200" dirty="0">
-                <a:latin typeface="Consolas" panose="020B0609020204030204" pitchFamily="49" charset="0"/>
-                <a:cs typeface="Consolas" panose="020B0609020204030204" pitchFamily="49" charset="0"/>
+              <a:rPr lang="en-US" sz="3000" b="0" dirty="0">
+                <a:solidFill>
+                  <a:srgbClr val="657B83"/>
+                </a:solidFill>
+                <a:effectLst/>
+                <a:latin typeface="Menlo" panose="020B0609030804020204" pitchFamily="49" charset="0"/>
               </a:rPr>
               <a:t>}</a:t>
             </a:r>
@@ -5223,13 +5173,22 @@
         </p:nvSpPr>
         <p:spPr>
           <a:xfrm>
-            <a:off x="22010909" y="16706315"/>
-            <a:ext cx="9842709" cy="4524315"/>
+            <a:off x="22010909" y="16937198"/>
+            <a:ext cx="9842709" cy="4247317"/>
           </a:xfrm>
           <a:prstGeom prst="rect">
             <a:avLst/>
           </a:prstGeom>
-          <a:noFill/>
+          <a:solidFill>
+            <a:srgbClr val="FCF6E5"/>
+          </a:solidFill>
+          <a:ln>
+            <a:solidFill>
+              <a:schemeClr val="accent1">
+                <a:shade val="50000"/>
+              </a:schemeClr>
+            </a:solidFill>
+          </a:ln>
         </p:spPr>
         <p:txBody>
           <a:bodyPr wrap="square" rtlCol="0">
@@ -5238,363 +5197,611 @@
           <a:lstStyle/>
           <a:p>
             <a:r>
-              <a:rPr lang="en-US" sz="3200" dirty="0" err="1">
-                <a:solidFill>
-                  <a:schemeClr val="accent2">
-                    <a:lumMod val="50000"/>
-                  </a:schemeClr>
-                </a:solidFill>
-                <a:latin typeface="Consolas" panose="020B0609020204030204" pitchFamily="49" charset="0"/>
-                <a:cs typeface="Consolas" panose="020B0609020204030204" pitchFamily="49" charset="0"/>
+              <a:rPr lang="en-US" sz="3000" b="0" dirty="0" err="1">
+                <a:solidFill>
+                  <a:srgbClr val="859900"/>
+                </a:solidFill>
+                <a:effectLst/>
+                <a:latin typeface="Menlo" panose="020B0609030804020204" pitchFamily="49" charset="0"/>
               </a:rPr>
               <a:t>fn</a:t>
             </a:r>
             <a:r>
-              <a:rPr lang="en-US" sz="3200" dirty="0">
-                <a:latin typeface="Consolas" panose="020B0609020204030204" pitchFamily="49" charset="0"/>
-                <a:cs typeface="Consolas" panose="020B0609020204030204" pitchFamily="49" charset="0"/>
+              <a:rPr lang="en-US" sz="3000" b="0" dirty="0">
+                <a:solidFill>
+                  <a:srgbClr val="657B83"/>
+                </a:solidFill>
+                <a:effectLst/>
+                <a:latin typeface="Menlo" panose="020B0609030804020204" pitchFamily="49" charset="0"/>
               </a:rPr>
               <a:t> </a:t>
             </a:r>
             <a:r>
-              <a:rPr lang="en-US" sz="3200" dirty="0">
-                <a:solidFill>
-                  <a:srgbClr val="0070C0"/>
-                </a:solidFill>
-                <a:latin typeface="Consolas" panose="020B0609020204030204" pitchFamily="49" charset="0"/>
-                <a:cs typeface="Consolas" panose="020B0609020204030204" pitchFamily="49" charset="0"/>
+              <a:rPr lang="en-US" sz="3000" b="0" dirty="0">
+                <a:solidFill>
+                  <a:srgbClr val="268BD2"/>
+                </a:solidFill>
+                <a:effectLst/>
+                <a:latin typeface="Menlo" panose="020B0609030804020204" pitchFamily="49" charset="0"/>
               </a:rPr>
               <a:t>iu_prog1</a:t>
             </a:r>
             <a:r>
-              <a:rPr lang="en-US" sz="3200" dirty="0">
-                <a:latin typeface="Consolas" panose="020B0609020204030204" pitchFamily="49" charset="0"/>
-                <a:cs typeface="Consolas" panose="020B0609020204030204" pitchFamily="49" charset="0"/>
+              <a:rPr lang="en-US" sz="3000" b="0" dirty="0">
+                <a:solidFill>
+                  <a:srgbClr val="657B83"/>
+                </a:solidFill>
+                <a:effectLst/>
+                <a:latin typeface="Menlo" panose="020B0609030804020204" pitchFamily="49" charset="0"/>
               </a:rPr>
               <a:t>(</a:t>
             </a:r>
             <a:r>
-              <a:rPr lang="en-US" sz="3200" dirty="0" err="1">
-                <a:latin typeface="Consolas" panose="020B0609020204030204" pitchFamily="49" charset="0"/>
-                <a:cs typeface="Consolas" panose="020B0609020204030204" pitchFamily="49" charset="0"/>
+              <a:rPr lang="en-US" sz="3000" b="0" dirty="0" err="1">
+                <a:solidFill>
+                  <a:srgbClr val="268BD2"/>
+                </a:solidFill>
+                <a:effectLst/>
+                <a:latin typeface="Menlo" panose="020B0609030804020204" pitchFamily="49" charset="0"/>
               </a:rPr>
               <a:t>ctx</a:t>
             </a:r>
             <a:r>
-              <a:rPr lang="en-US" sz="3200" dirty="0">
-                <a:latin typeface="Consolas" panose="020B0609020204030204" pitchFamily="49" charset="0"/>
-                <a:cs typeface="Consolas" panose="020B0609020204030204" pitchFamily="49" charset="0"/>
-              </a:rPr>
-              <a:t>: </a:t>
-            </a:r>
-            <a:r>
-              <a:rPr lang="en-US" sz="3200" dirty="0">
-                <a:solidFill>
-                  <a:srgbClr val="0070C0"/>
-                </a:solidFill>
-                <a:latin typeface="Consolas" panose="020B0609020204030204" pitchFamily="49" charset="0"/>
-                <a:cs typeface="Consolas" panose="020B0609020204030204" pitchFamily="49" charset="0"/>
+              <a:rPr lang="en-US" sz="3000" b="0" dirty="0">
+                <a:solidFill>
+                  <a:srgbClr val="859900"/>
+                </a:solidFill>
+                <a:effectLst/>
+                <a:latin typeface="Menlo" panose="020B0609030804020204" pitchFamily="49" charset="0"/>
+              </a:rPr>
+              <a:t>:</a:t>
+            </a:r>
+            <a:r>
+              <a:rPr lang="en-US" sz="3000" b="0" dirty="0">
+                <a:solidFill>
+                  <a:srgbClr val="657B83"/>
+                </a:solidFill>
+                <a:effectLst/>
+                <a:latin typeface="Menlo" panose="020B0609030804020204" pitchFamily="49" charset="0"/>
+              </a:rPr>
+              <a:t> </a:t>
+            </a:r>
+            <a:r>
+              <a:rPr lang="en-US" sz="3000" b="0" dirty="0">
+                <a:solidFill>
+                  <a:srgbClr val="859900"/>
+                </a:solidFill>
+                <a:effectLst/>
+                <a:latin typeface="Menlo" panose="020B0609030804020204" pitchFamily="49" charset="0"/>
               </a:rPr>
               <a:t>*</a:t>
             </a:r>
             <a:r>
-              <a:rPr lang="en-US" sz="3200" dirty="0">
-                <a:solidFill>
-                  <a:schemeClr val="accent2">
-                    <a:lumMod val="50000"/>
-                  </a:schemeClr>
-                </a:solidFill>
-                <a:latin typeface="Consolas" panose="020B0609020204030204" pitchFamily="49" charset="0"/>
-                <a:cs typeface="Consolas" panose="020B0609020204030204" pitchFamily="49" charset="0"/>
+              <a:rPr lang="en-US" sz="3000" b="1" dirty="0">
+                <a:solidFill>
+                  <a:srgbClr val="586E75"/>
+                </a:solidFill>
+                <a:effectLst/>
+                <a:latin typeface="Menlo" panose="020B0609030804020204" pitchFamily="49" charset="0"/>
               </a:rPr>
               <a:t>const</a:t>
             </a:r>
             <a:r>
-              <a:rPr lang="en-US" sz="3200" dirty="0">
-                <a:latin typeface="Consolas" panose="020B0609020204030204" pitchFamily="49" charset="0"/>
-                <a:cs typeface="Consolas" panose="020B0609020204030204" pitchFamily="49" charset="0"/>
-              </a:rPr>
-              <a:t> ()) -&gt; i32</a:t>
-            </a:r>
-          </a:p>
-          <a:p>
-            <a:r>
-              <a:rPr lang="en-US" sz="3200" dirty="0">
-                <a:latin typeface="Consolas" panose="020B0609020204030204" pitchFamily="49" charset="0"/>
-                <a:cs typeface="Consolas" panose="020B0609020204030204" pitchFamily="49" charset="0"/>
+              <a:rPr lang="en-US" sz="3000" b="0" dirty="0">
+                <a:solidFill>
+                  <a:srgbClr val="657B83"/>
+                </a:solidFill>
+                <a:effectLst/>
+                <a:latin typeface="Menlo" panose="020B0609030804020204" pitchFamily="49" charset="0"/>
+              </a:rPr>
+              <a:t> ()) </a:t>
+            </a:r>
+            <a:r>
+              <a:rPr lang="en-US" sz="3000" b="0" dirty="0">
+                <a:solidFill>
+                  <a:srgbClr val="859900"/>
+                </a:solidFill>
+                <a:effectLst/>
+                <a:latin typeface="Menlo" panose="020B0609030804020204" pitchFamily="49" charset="0"/>
+              </a:rPr>
+              <a:t>-&gt;</a:t>
+            </a:r>
+            <a:r>
+              <a:rPr lang="en-US" sz="3000" b="0" dirty="0">
+                <a:solidFill>
+                  <a:srgbClr val="657B83"/>
+                </a:solidFill>
+                <a:effectLst/>
+                <a:latin typeface="Menlo" panose="020B0609030804020204" pitchFamily="49" charset="0"/>
+              </a:rPr>
+              <a:t> </a:t>
+            </a:r>
+            <a:r>
+              <a:rPr lang="en-US" sz="3000" b="0" dirty="0">
+                <a:solidFill>
+                  <a:srgbClr val="CB4B16"/>
+                </a:solidFill>
+                <a:effectLst/>
+                <a:latin typeface="Menlo" panose="020B0609030804020204" pitchFamily="49" charset="0"/>
+              </a:rPr>
+              <a:t>i32</a:t>
+            </a:r>
+            <a:endParaRPr lang="en-US" sz="3000" b="0" dirty="0">
+              <a:solidFill>
+                <a:srgbClr val="657B83"/>
+              </a:solidFill>
+              <a:effectLst/>
+              <a:latin typeface="Menlo" panose="020B0609030804020204" pitchFamily="49" charset="0"/>
+            </a:endParaRPr>
+          </a:p>
+          <a:p>
+            <a:r>
+              <a:rPr lang="en-US" sz="3000" b="0" dirty="0">
+                <a:solidFill>
+                  <a:srgbClr val="657B83"/>
+                </a:solidFill>
+                <a:effectLst/>
+                <a:latin typeface="Menlo" panose="020B0609030804020204" pitchFamily="49" charset="0"/>
               </a:rPr>
               <a:t>{</a:t>
             </a:r>
           </a:p>
           <a:p>
             <a:r>
-              <a:rPr lang="en-US" sz="3200" dirty="0">
-                <a:latin typeface="Consolas" panose="020B0609020204030204" pitchFamily="49" charset="0"/>
-                <a:cs typeface="Consolas" panose="020B0609020204030204" pitchFamily="49" charset="0"/>
+              <a:rPr lang="en-US" sz="3000" b="1" dirty="0">
+                <a:solidFill>
+                  <a:srgbClr val="586E75"/>
+                </a:solidFill>
+                <a:effectLst/>
+                <a:latin typeface="Menlo" panose="020B0609030804020204" pitchFamily="49" charset="0"/>
+              </a:rPr>
+              <a:t>  let</a:t>
+            </a:r>
+            <a:r>
+              <a:rPr lang="en-US" sz="3000" b="0" dirty="0">
+                <a:solidFill>
+                  <a:srgbClr val="657B83"/>
+                </a:solidFill>
+                <a:effectLst/>
+                <a:latin typeface="Menlo" panose="020B0609030804020204" pitchFamily="49" charset="0"/>
+              </a:rPr>
+              <a:t> </a:t>
+            </a:r>
+            <a:r>
+              <a:rPr lang="en-US" sz="3000" b="1" dirty="0">
+                <a:solidFill>
+                  <a:srgbClr val="586E75"/>
+                </a:solidFill>
+                <a:effectLst/>
+                <a:latin typeface="Menlo" panose="020B0609030804020204" pitchFamily="49" charset="0"/>
+              </a:rPr>
+              <a:t>mut</a:t>
+            </a:r>
+            <a:r>
+              <a:rPr lang="en-US" sz="3000" b="0" dirty="0">
+                <a:solidFill>
+                  <a:srgbClr val="657B83"/>
+                </a:solidFill>
+                <a:effectLst/>
+                <a:latin typeface="Menlo" panose="020B0609030804020204" pitchFamily="49" charset="0"/>
+              </a:rPr>
+              <a:t> </a:t>
+            </a:r>
+            <a:r>
+              <a:rPr lang="en-US" sz="3000" b="0" dirty="0">
+                <a:solidFill>
+                  <a:srgbClr val="268BD2"/>
+                </a:solidFill>
+                <a:effectLst/>
+                <a:latin typeface="Menlo" panose="020B0609030804020204" pitchFamily="49" charset="0"/>
+              </a:rPr>
+              <a:t>guard</a:t>
+            </a:r>
+            <a:r>
+              <a:rPr lang="en-US" sz="3000" b="0" dirty="0">
+                <a:solidFill>
+                  <a:srgbClr val="657B83"/>
+                </a:solidFill>
+                <a:effectLst/>
+                <a:latin typeface="Menlo" panose="020B0609030804020204" pitchFamily="49" charset="0"/>
+              </a:rPr>
+              <a:t> </a:t>
+            </a:r>
+            <a:r>
+              <a:rPr lang="en-US" sz="3000" b="0" dirty="0">
+                <a:solidFill>
+                  <a:srgbClr val="859900"/>
+                </a:solidFill>
+                <a:effectLst/>
+                <a:latin typeface="Menlo" panose="020B0609030804020204" pitchFamily="49" charset="0"/>
+              </a:rPr>
+              <a:t>=</a:t>
+            </a:r>
+            <a:r>
+              <a:rPr lang="en-US" sz="3000" dirty="0">
+                <a:solidFill>
+                  <a:srgbClr val="657B83"/>
+                </a:solidFill>
+                <a:latin typeface="Menlo" panose="020B0609030804020204" pitchFamily="49" charset="0"/>
+              </a:rPr>
+              <a:t> </a:t>
+            </a:r>
+            <a:r>
+              <a:rPr lang="en-US" sz="3000" b="0" dirty="0" err="1">
+                <a:solidFill>
+                  <a:srgbClr val="CB4B16"/>
+                </a:solidFill>
+                <a:effectLst/>
+                <a:latin typeface="Menlo" panose="020B0609030804020204" pitchFamily="49" charset="0"/>
+              </a:rPr>
+              <a:t>spin_lock_guard</a:t>
+            </a:r>
+            <a:r>
+              <a:rPr lang="en-US" sz="3000" b="0" dirty="0">
+                <a:solidFill>
+                  <a:srgbClr val="859900"/>
+                </a:solidFill>
+                <a:effectLst/>
+                <a:latin typeface="Menlo" panose="020B0609030804020204" pitchFamily="49" charset="0"/>
+              </a:rPr>
+              <a:t>::</a:t>
+            </a:r>
+            <a:r>
+              <a:rPr lang="en-US" sz="3000" b="0" dirty="0">
+                <a:solidFill>
+                  <a:srgbClr val="268BD2"/>
+                </a:solidFill>
+                <a:effectLst/>
+                <a:latin typeface="Menlo" panose="020B0609030804020204" pitchFamily="49" charset="0"/>
+              </a:rPr>
+              <a:t>new</a:t>
+            </a:r>
+            <a:r>
+              <a:rPr lang="en-US" sz="3000" b="0" dirty="0">
+                <a:solidFill>
+                  <a:srgbClr val="657B83"/>
+                </a:solidFill>
+                <a:effectLst/>
+                <a:latin typeface="Menlo" panose="020B0609030804020204" pitchFamily="49" charset="0"/>
+              </a:rPr>
+              <a:t>(</a:t>
+            </a:r>
+            <a:r>
+              <a:rPr lang="en-US" sz="3000" b="0" dirty="0">
+                <a:solidFill>
+                  <a:srgbClr val="268BD2"/>
+                </a:solidFill>
+                <a:effectLst/>
+                <a:latin typeface="Menlo" panose="020B0609030804020204" pitchFamily="49" charset="0"/>
+              </a:rPr>
+              <a:t>l</a:t>
+            </a:r>
+            <a:r>
+              <a:rPr lang="en-US" sz="3000" b="0" dirty="0">
+                <a:solidFill>
+                  <a:srgbClr val="657B83"/>
+                </a:solidFill>
+                <a:effectLst/>
+                <a:latin typeface="Menlo" panose="020B0609030804020204" pitchFamily="49" charset="0"/>
+              </a:rPr>
+              <a:t>);</a:t>
+            </a:r>
+          </a:p>
+          <a:p>
+            <a:r>
+              <a:rPr lang="en-US" sz="3000" b="0" dirty="0">
+                <a:solidFill>
+                  <a:srgbClr val="268BD2"/>
+                </a:solidFill>
+                <a:effectLst/>
+                <a:latin typeface="Menlo" panose="020B0609030804020204" pitchFamily="49" charset="0"/>
               </a:rPr>
               <a:t>  </a:t>
             </a:r>
             <a:r>
-              <a:rPr lang="en-US" sz="3200" dirty="0">
-                <a:solidFill>
-                  <a:schemeClr val="accent2">
-                    <a:lumMod val="50000"/>
-                  </a:schemeClr>
-                </a:solidFill>
-                <a:latin typeface="Consolas" panose="020B0609020204030204" pitchFamily="49" charset="0"/>
-                <a:cs typeface="Consolas" panose="020B0609020204030204" pitchFamily="49" charset="0"/>
-              </a:rPr>
-              <a:t>let</a:t>
-            </a:r>
-            <a:r>
-              <a:rPr lang="en-US" sz="3200" dirty="0">
-                <a:latin typeface="Consolas" panose="020B0609020204030204" pitchFamily="49" charset="0"/>
-                <a:cs typeface="Consolas" panose="020B0609020204030204" pitchFamily="49" charset="0"/>
+              <a:rPr lang="en-US" sz="3000" b="0" dirty="0" err="1">
+                <a:solidFill>
+                  <a:srgbClr val="268BD2"/>
+                </a:solidFill>
+                <a:effectLst/>
+                <a:latin typeface="Menlo" panose="020B0609030804020204" pitchFamily="49" charset="0"/>
+              </a:rPr>
+              <a:t>guard</a:t>
+            </a:r>
+            <a:r>
+              <a:rPr lang="en-US" sz="3000" b="0" dirty="0" err="1">
+                <a:solidFill>
+                  <a:srgbClr val="859900"/>
+                </a:solidFill>
+                <a:effectLst/>
+                <a:latin typeface="Menlo" panose="020B0609030804020204" pitchFamily="49" charset="0"/>
+              </a:rPr>
+              <a:t>.</a:t>
+            </a:r>
+            <a:r>
+              <a:rPr lang="en-US" sz="3000" b="0" dirty="0" err="1">
+                <a:solidFill>
+                  <a:srgbClr val="268BD2"/>
+                </a:solidFill>
+                <a:effectLst/>
+                <a:latin typeface="Menlo" panose="020B0609030804020204" pitchFamily="49" charset="0"/>
+              </a:rPr>
+              <a:t>lock</a:t>
+            </a:r>
+            <a:r>
+              <a:rPr lang="en-US" sz="3000" b="0" dirty="0">
+                <a:solidFill>
+                  <a:srgbClr val="657B83"/>
+                </a:solidFill>
+                <a:effectLst/>
+                <a:latin typeface="Menlo" panose="020B0609030804020204" pitchFamily="49" charset="0"/>
+              </a:rPr>
+              <a:t>();</a:t>
+            </a:r>
+          </a:p>
+          <a:p>
+            <a:r>
+              <a:rPr lang="en-US" sz="3000" b="0" dirty="0">
+                <a:solidFill>
+                  <a:srgbClr val="859900"/>
+                </a:solidFill>
+                <a:effectLst/>
+                <a:latin typeface="Menlo" panose="020B0609030804020204" pitchFamily="49" charset="0"/>
+              </a:rPr>
+              <a:t>  if</a:t>
+            </a:r>
+            <a:r>
+              <a:rPr lang="en-US" sz="3000" b="0" dirty="0">
+                <a:solidFill>
+                  <a:srgbClr val="657B83"/>
+                </a:solidFill>
+                <a:effectLst/>
+                <a:latin typeface="Menlo" panose="020B0609030804020204" pitchFamily="49" charset="0"/>
               </a:rPr>
               <a:t> </a:t>
             </a:r>
             <a:r>
-              <a:rPr lang="en-US" sz="3200" dirty="0">
-                <a:solidFill>
-                  <a:schemeClr val="accent2">
-                    <a:lumMod val="50000"/>
-                  </a:schemeClr>
-                </a:solidFill>
-                <a:latin typeface="Consolas" panose="020B0609020204030204" pitchFamily="49" charset="0"/>
-                <a:cs typeface="Consolas" panose="020B0609020204030204" pitchFamily="49" charset="0"/>
-              </a:rPr>
-              <a:t>mut</a:t>
-            </a:r>
-            <a:r>
-              <a:rPr lang="en-US" sz="3200" dirty="0">
-                <a:latin typeface="Consolas" panose="020B0609020204030204" pitchFamily="49" charset="0"/>
-                <a:cs typeface="Consolas" panose="020B0609020204030204" pitchFamily="49" charset="0"/>
-              </a:rPr>
-              <a:t> guard = </a:t>
-            </a:r>
-            <a:r>
-              <a:rPr lang="en-US" sz="3200" dirty="0" err="1">
-                <a:latin typeface="Consolas" panose="020B0609020204030204" pitchFamily="49" charset="0"/>
-                <a:cs typeface="Consolas" panose="020B0609020204030204" pitchFamily="49" charset="0"/>
-              </a:rPr>
-              <a:t>spin_lock_guard</a:t>
-            </a:r>
-            <a:r>
-              <a:rPr lang="en-US" sz="3200" dirty="0">
-                <a:latin typeface="Consolas" panose="020B0609020204030204" pitchFamily="49" charset="0"/>
-                <a:cs typeface="Consolas" panose="020B0609020204030204" pitchFamily="49" charset="0"/>
-              </a:rPr>
-              <a:t>::</a:t>
-            </a:r>
-            <a:r>
-              <a:rPr lang="en-US" sz="3200" dirty="0">
-                <a:solidFill>
-                  <a:srgbClr val="0070C0"/>
-                </a:solidFill>
-                <a:latin typeface="Consolas" panose="020B0609020204030204" pitchFamily="49" charset="0"/>
-                <a:cs typeface="Consolas" panose="020B0609020204030204" pitchFamily="49" charset="0"/>
-              </a:rPr>
-              <a:t>new</a:t>
-            </a:r>
-            <a:r>
-              <a:rPr lang="en-US" sz="3200" dirty="0">
-                <a:latin typeface="Consolas" panose="020B0609020204030204" pitchFamily="49" charset="0"/>
-                <a:cs typeface="Consolas" panose="020B0609020204030204" pitchFamily="49" charset="0"/>
-              </a:rPr>
-              <a:t>(l);</a:t>
-            </a:r>
-          </a:p>
-          <a:p>
-            <a:r>
-              <a:rPr lang="en-US" sz="3200" dirty="0">
-                <a:latin typeface="Consolas" panose="020B0609020204030204" pitchFamily="49" charset="0"/>
-                <a:cs typeface="Consolas" panose="020B0609020204030204" pitchFamily="49" charset="0"/>
-              </a:rPr>
-              <a:t>  </a:t>
-            </a:r>
-            <a:r>
-              <a:rPr lang="en-US" sz="3200" dirty="0" err="1">
-                <a:latin typeface="Consolas" panose="020B0609020204030204" pitchFamily="49" charset="0"/>
-                <a:cs typeface="Consolas" panose="020B0609020204030204" pitchFamily="49" charset="0"/>
-              </a:rPr>
-              <a:t>guard.</a:t>
-            </a:r>
-            <a:r>
-              <a:rPr lang="en-US" sz="3200" dirty="0" err="1">
-                <a:solidFill>
-                  <a:srgbClr val="0070C0"/>
-                </a:solidFill>
-                <a:latin typeface="Consolas" panose="020B0609020204030204" pitchFamily="49" charset="0"/>
-                <a:cs typeface="Consolas" panose="020B0609020204030204" pitchFamily="49" charset="0"/>
-              </a:rPr>
-              <a:t>lock</a:t>
-            </a:r>
-            <a:r>
-              <a:rPr lang="en-US" sz="3200" dirty="0">
-                <a:latin typeface="Consolas" panose="020B0609020204030204" pitchFamily="49" charset="0"/>
-                <a:cs typeface="Consolas" panose="020B0609020204030204" pitchFamily="49" charset="0"/>
-              </a:rPr>
-              <a:t>();</a:t>
-            </a:r>
-          </a:p>
-          <a:p>
-            <a:r>
-              <a:rPr lang="en-US" sz="3200" dirty="0">
-                <a:latin typeface="Consolas" panose="020B0609020204030204" pitchFamily="49" charset="0"/>
-                <a:cs typeface="Consolas" panose="020B0609020204030204" pitchFamily="49" charset="0"/>
-              </a:rPr>
-              <a:t>  </a:t>
-            </a:r>
-            <a:r>
-              <a:rPr lang="en-US" sz="3200" dirty="0">
-                <a:solidFill>
-                  <a:schemeClr val="accent2">
-                    <a:lumMod val="50000"/>
-                  </a:schemeClr>
-                </a:solidFill>
-                <a:latin typeface="Consolas" panose="020B0609020204030204" pitchFamily="49" charset="0"/>
-                <a:cs typeface="Consolas" panose="020B0609020204030204" pitchFamily="49" charset="0"/>
-              </a:rPr>
-              <a:t>if</a:t>
-            </a:r>
-            <a:r>
-              <a:rPr lang="en-US" sz="3200" dirty="0">
-                <a:latin typeface="Consolas" panose="020B0609020204030204" pitchFamily="49" charset="0"/>
-                <a:cs typeface="Consolas" panose="020B0609020204030204" pitchFamily="49" charset="0"/>
-              </a:rPr>
-              <a:t> </a:t>
-            </a:r>
-            <a:r>
-              <a:rPr lang="en-US" sz="3200" dirty="0" err="1">
-                <a:latin typeface="Consolas" panose="020B0609020204030204" pitchFamily="49" charset="0"/>
-                <a:cs typeface="Consolas" panose="020B0609020204030204" pitchFamily="49" charset="0"/>
+              <a:rPr lang="en-US" sz="3000" b="0" dirty="0" err="1">
+                <a:solidFill>
+                  <a:srgbClr val="268BD2"/>
+                </a:solidFill>
+                <a:effectLst/>
+                <a:latin typeface="Menlo" panose="020B0609030804020204" pitchFamily="49" charset="0"/>
               </a:rPr>
               <a:t>some_cond</a:t>
             </a:r>
             <a:r>
-              <a:rPr lang="en-US" sz="3200" dirty="0">
-                <a:latin typeface="Consolas" panose="020B0609020204030204" pitchFamily="49" charset="0"/>
-                <a:cs typeface="Consolas" panose="020B0609020204030204" pitchFamily="49" charset="0"/>
+              <a:rPr lang="en-US" sz="3000" b="0" dirty="0">
+                <a:solidFill>
+                  <a:srgbClr val="657B83"/>
+                </a:solidFill>
+                <a:effectLst/>
+                <a:latin typeface="Menlo" panose="020B0609030804020204" pitchFamily="49" charset="0"/>
               </a:rPr>
               <a:t> { </a:t>
             </a:r>
             <a:r>
-              <a:rPr lang="en-US" sz="3200" dirty="0">
-                <a:solidFill>
-                  <a:srgbClr val="0070C0"/>
-                </a:solidFill>
-                <a:latin typeface="Consolas" panose="020B0609020204030204" pitchFamily="49" charset="0"/>
-                <a:cs typeface="Consolas" panose="020B0609020204030204" pitchFamily="49" charset="0"/>
+              <a:rPr lang="en-US" sz="3000" b="0" dirty="0">
+                <a:solidFill>
+                  <a:srgbClr val="D33682"/>
+                </a:solidFill>
+                <a:effectLst/>
+                <a:latin typeface="Menlo" panose="020B0609030804020204" pitchFamily="49" charset="0"/>
               </a:rPr>
               <a:t>0</a:t>
             </a:r>
             <a:r>
-              <a:rPr lang="en-US" sz="3200" dirty="0">
-                <a:latin typeface="Consolas" panose="020B0609020204030204" pitchFamily="49" charset="0"/>
-                <a:cs typeface="Consolas" panose="020B0609020204030204" pitchFamily="49" charset="0"/>
+              <a:rPr lang="en-US" sz="3000" b="0" dirty="0">
+                <a:solidFill>
+                  <a:srgbClr val="657B83"/>
+                </a:solidFill>
+                <a:effectLst/>
+                <a:latin typeface="Menlo" panose="020B0609030804020204" pitchFamily="49" charset="0"/>
               </a:rPr>
               <a:t> } </a:t>
             </a:r>
             <a:r>
-              <a:rPr lang="en-US" sz="3200" dirty="0">
-                <a:solidFill>
-                  <a:schemeClr val="accent2">
-                    <a:lumMod val="50000"/>
-                  </a:schemeClr>
-                </a:solidFill>
-                <a:latin typeface="Consolas" panose="020B0609020204030204" pitchFamily="49" charset="0"/>
-                <a:cs typeface="Consolas" panose="020B0609020204030204" pitchFamily="49" charset="0"/>
+              <a:rPr lang="en-US" sz="3000" b="0" dirty="0">
+                <a:solidFill>
+                  <a:srgbClr val="859900"/>
+                </a:solidFill>
+                <a:effectLst/>
+                <a:latin typeface="Menlo" panose="020B0609030804020204" pitchFamily="49" charset="0"/>
               </a:rPr>
               <a:t>else</a:t>
             </a:r>
             <a:r>
-              <a:rPr lang="en-US" sz="3200" dirty="0">
-                <a:latin typeface="Consolas" panose="020B0609020204030204" pitchFamily="49" charset="0"/>
-                <a:cs typeface="Consolas" panose="020B0609020204030204" pitchFamily="49" charset="0"/>
+              <a:rPr lang="en-US" sz="3000" b="0" dirty="0">
+                <a:solidFill>
+                  <a:srgbClr val="657B83"/>
+                </a:solidFill>
+                <a:effectLst/>
+                <a:latin typeface="Menlo" panose="020B0609030804020204" pitchFamily="49" charset="0"/>
               </a:rPr>
               <a:t> { </a:t>
             </a:r>
             <a:r>
-              <a:rPr lang="en-US" sz="3200" dirty="0">
-                <a:solidFill>
-                  <a:srgbClr val="0070C0"/>
-                </a:solidFill>
-                <a:latin typeface="Consolas" panose="020B0609020204030204" pitchFamily="49" charset="0"/>
-                <a:cs typeface="Consolas" panose="020B0609020204030204" pitchFamily="49" charset="0"/>
+              <a:rPr lang="en-US" sz="3000" b="0" dirty="0">
+                <a:solidFill>
+                  <a:srgbClr val="D33682"/>
+                </a:solidFill>
+                <a:effectLst/>
+                <a:latin typeface="Menlo" panose="020B0609030804020204" pitchFamily="49" charset="0"/>
               </a:rPr>
               <a:t>1</a:t>
             </a:r>
             <a:r>
-              <a:rPr lang="en-US" sz="3200" dirty="0">
-                <a:latin typeface="Consolas" panose="020B0609020204030204" pitchFamily="49" charset="0"/>
-                <a:cs typeface="Consolas" panose="020B0609020204030204" pitchFamily="49" charset="0"/>
+              <a:rPr lang="en-US" sz="3000" b="0" dirty="0">
+                <a:solidFill>
+                  <a:srgbClr val="657B83"/>
+                </a:solidFill>
+                <a:effectLst/>
+                <a:latin typeface="Menlo" panose="020B0609030804020204" pitchFamily="49" charset="0"/>
               </a:rPr>
               <a:t> }</a:t>
             </a:r>
           </a:p>
           <a:p>
             <a:r>
-              <a:rPr lang="en-US" sz="3200" dirty="0">
-                <a:latin typeface="Consolas" panose="020B0609020204030204" pitchFamily="49" charset="0"/>
-                <a:cs typeface="Consolas" panose="020B0609020204030204" pitchFamily="49" charset="0"/>
-              </a:rPr>
-              <a:t>  </a:t>
-            </a:r>
-            <a:r>
-              <a:rPr lang="en-US" sz="3200" dirty="0">
-                <a:solidFill>
-                  <a:schemeClr val="tx1">
-                    <a:lumMod val="50000"/>
-                    <a:lumOff val="50000"/>
-                  </a:schemeClr>
-                </a:solidFill>
-                <a:latin typeface="Consolas" panose="020B0609020204030204" pitchFamily="49" charset="0"/>
-                <a:cs typeface="Consolas" panose="020B0609020204030204" pitchFamily="49" charset="0"/>
-              </a:rPr>
-              <a:t>/* Always unlocked when `guard` goes</a:t>
-            </a:r>
-          </a:p>
-          <a:p>
-            <a:r>
-              <a:rPr lang="en-US" sz="3200" dirty="0">
-                <a:solidFill>
-                  <a:schemeClr val="tx1">
-                    <a:lumMod val="50000"/>
-                    <a:lumOff val="50000"/>
-                  </a:schemeClr>
-                </a:solidFill>
-                <a:latin typeface="Consolas" panose="020B0609020204030204" pitchFamily="49" charset="0"/>
-                <a:cs typeface="Consolas" panose="020B0609020204030204" pitchFamily="49" charset="0"/>
+              <a:rPr lang="en-US" sz="3000" b="0" i="1" dirty="0">
+                <a:solidFill>
+                  <a:srgbClr val="93A1A1"/>
+                </a:solidFill>
+                <a:effectLst/>
+                <a:latin typeface="Menlo" panose="020B0609030804020204" pitchFamily="49" charset="0"/>
+              </a:rPr>
+              <a:t>  /* Always unlocked when `guard` goes</a:t>
+            </a:r>
+            <a:endParaRPr lang="en-US" sz="3000" b="0" dirty="0">
+              <a:solidFill>
+                <a:srgbClr val="657B83"/>
+              </a:solidFill>
+              <a:effectLst/>
+              <a:latin typeface="Menlo" panose="020B0609030804020204" pitchFamily="49" charset="0"/>
+            </a:endParaRPr>
+          </a:p>
+          <a:p>
+            <a:r>
+              <a:rPr lang="en-US" sz="3000" b="0" i="1" dirty="0">
+                <a:solidFill>
+                  <a:srgbClr val="93A1A1"/>
+                </a:solidFill>
+                <a:effectLst/>
+                <a:latin typeface="Menlo" panose="020B0609030804020204" pitchFamily="49" charset="0"/>
               </a:rPr>
               <a:t>   * out-of-scope</a:t>
             </a:r>
-          </a:p>
-          <a:p>
-            <a:r>
-              <a:rPr lang="en-US" sz="3200" dirty="0">
-                <a:solidFill>
-                  <a:schemeClr val="tx1">
-                    <a:lumMod val="50000"/>
-                    <a:lumOff val="50000"/>
-                  </a:schemeClr>
-                </a:solidFill>
-                <a:latin typeface="Consolas" panose="020B0609020204030204" pitchFamily="49" charset="0"/>
-                <a:cs typeface="Consolas" panose="020B0609020204030204" pitchFamily="49" charset="0"/>
+            <a:endParaRPr lang="en-US" sz="3000" b="0" dirty="0">
+              <a:solidFill>
+                <a:srgbClr val="657B83"/>
+              </a:solidFill>
+              <a:effectLst/>
+              <a:latin typeface="Menlo" panose="020B0609030804020204" pitchFamily="49" charset="0"/>
+            </a:endParaRPr>
+          </a:p>
+          <a:p>
+            <a:r>
+              <a:rPr lang="en-US" sz="3000" b="0" i="1" dirty="0">
+                <a:solidFill>
+                  <a:srgbClr val="93A1A1"/>
+                </a:solidFill>
+                <a:effectLst/>
+                <a:latin typeface="Menlo" panose="020B0609030804020204" pitchFamily="49" charset="0"/>
               </a:rPr>
               <a:t>   */</a:t>
             </a:r>
-          </a:p>
-          <a:p>
-            <a:r>
-              <a:rPr lang="en-US" sz="3200" dirty="0">
-                <a:latin typeface="Consolas" panose="020B0609020204030204" pitchFamily="49" charset="0"/>
-                <a:cs typeface="Consolas" panose="020B0609020204030204" pitchFamily="49" charset="0"/>
+            <a:endParaRPr lang="en-US" sz="3000" b="0" dirty="0">
+              <a:solidFill>
+                <a:srgbClr val="657B83"/>
+              </a:solidFill>
+              <a:effectLst/>
+              <a:latin typeface="Menlo" panose="020B0609030804020204" pitchFamily="49" charset="0"/>
+            </a:endParaRPr>
+          </a:p>
+          <a:p>
+            <a:r>
+              <a:rPr lang="en-US" sz="3000" b="0" dirty="0">
+                <a:solidFill>
+                  <a:srgbClr val="657B83"/>
+                </a:solidFill>
+                <a:effectLst/>
+                <a:latin typeface="Menlo" panose="020B0609030804020204" pitchFamily="49" charset="0"/>
               </a:rPr>
               <a:t>}</a:t>
             </a:r>
           </a:p>
         </p:txBody>
       </p:sp>
+      <p:pic>
+        <p:nvPicPr>
+          <p:cNvPr id="46" name="Picture 45">
+            <a:extLst>
+              <a:ext uri="{FF2B5EF4-FFF2-40B4-BE49-F238E27FC236}">
+                <a16:creationId xmlns:a16="http://schemas.microsoft.com/office/drawing/2014/main" id="{D8597902-61DB-A411-D710-200C9B5A4FE9}"/>
+              </a:ext>
+            </a:extLst>
+          </p:cNvPr>
+          <p:cNvPicPr>
+            <a:picLocks noChangeAspect="1"/>
+          </p:cNvPicPr>
+          <p:nvPr/>
+        </p:nvPicPr>
+        <p:blipFill>
+          <a:blip r:embed="rId8"/>
+          <a:stretch>
+            <a:fillRect/>
+          </a:stretch>
+        </p:blipFill>
+        <p:spPr>
+          <a:xfrm>
+            <a:off x="1064778" y="15340780"/>
+            <a:ext cx="9842710" cy="2952813"/>
+          </a:xfrm>
+          <a:prstGeom prst="rect">
+            <a:avLst/>
+          </a:prstGeom>
+        </p:spPr>
+      </p:pic>
+      <p:pic>
+        <p:nvPicPr>
+          <p:cNvPr id="48" name="Picture 47">
+            <a:extLst>
+              <a:ext uri="{FF2B5EF4-FFF2-40B4-BE49-F238E27FC236}">
+                <a16:creationId xmlns:a16="http://schemas.microsoft.com/office/drawing/2014/main" id="{9964CF9B-1451-393E-7E20-496457CA3879}"/>
+              </a:ext>
+            </a:extLst>
+          </p:cNvPr>
+          <p:cNvPicPr>
+            <a:picLocks noChangeAspect="1"/>
+          </p:cNvPicPr>
+          <p:nvPr/>
+        </p:nvPicPr>
+        <p:blipFill>
+          <a:blip r:embed="rId9"/>
+          <a:stretch>
+            <a:fillRect/>
+          </a:stretch>
+        </p:blipFill>
+        <p:spPr>
+          <a:xfrm>
+            <a:off x="1064778" y="12484578"/>
+            <a:ext cx="9842710" cy="2952813"/>
+          </a:xfrm>
+          <a:prstGeom prst="rect">
+            <a:avLst/>
+          </a:prstGeom>
+        </p:spPr>
+      </p:pic>
+      <p:pic>
+        <p:nvPicPr>
+          <p:cNvPr id="16" name="Picture 15">
+            <a:extLst>
+              <a:ext uri="{FF2B5EF4-FFF2-40B4-BE49-F238E27FC236}">
+                <a16:creationId xmlns:a16="http://schemas.microsoft.com/office/drawing/2014/main" id="{38492B1A-878B-CB8E-1B44-404AA0C2AFD1}"/>
+              </a:ext>
+            </a:extLst>
+          </p:cNvPr>
+          <p:cNvPicPr>
+            <a:picLocks noChangeAspect="1"/>
+          </p:cNvPicPr>
+          <p:nvPr/>
+        </p:nvPicPr>
+        <p:blipFill>
+          <a:blip r:embed="rId10"/>
+          <a:stretch>
+            <a:fillRect/>
+          </a:stretch>
+        </p:blipFill>
+        <p:spPr>
+          <a:xfrm>
+            <a:off x="1975104" y="7788889"/>
+            <a:ext cx="8301720" cy="4838207"/>
+          </a:xfrm>
+          <a:prstGeom prst="rect">
+            <a:avLst/>
+          </a:prstGeom>
+        </p:spPr>
+      </p:pic>
     </p:spTree>
     <p:extLst>
       <p:ext uri="{BB962C8B-B14F-4D97-AF65-F5344CB8AC3E}">

</xml_diff>